<commit_message>
updated ppt and vsd files
</commit_message>
<xml_diff>
--- a/ml/tf/tf-from-scratch/3/code-exercises/ml-models-from-scratch.pptx
+++ b/ml/tf/tf-from-scratch/3/code-exercises/ml-models-from-scratch.pptx
@@ -8,10 +8,19 @@
     <p:sldId id="256" r:id="rId2"/>
     <p:sldId id="257" r:id="rId3"/>
     <p:sldId id="258" r:id="rId4"/>
-    <p:sldId id="259" r:id="rId5"/>
-    <p:sldId id="260" r:id="rId6"/>
-    <p:sldId id="261" r:id="rId7"/>
-    <p:sldId id="262" r:id="rId8"/>
+    <p:sldId id="264" r:id="rId5"/>
+    <p:sldId id="265" r:id="rId6"/>
+    <p:sldId id="267" r:id="rId7"/>
+    <p:sldId id="263" r:id="rId8"/>
+    <p:sldId id="259" r:id="rId9"/>
+    <p:sldId id="260" r:id="rId10"/>
+    <p:sldId id="266" r:id="rId11"/>
+    <p:sldId id="261" r:id="rId12"/>
+    <p:sldId id="262" r:id="rId13"/>
+    <p:sldId id="268" r:id="rId14"/>
+    <p:sldId id="269" r:id="rId15"/>
+    <p:sldId id="270" r:id="rId16"/>
+    <p:sldId id="271" r:id="rId17"/>
   </p:sldIdLst>
   <p:sldSz cx="12192000" cy="6858000"/>
   <p:notesSz cx="6858000" cy="9144000"/>
@@ -110,6 +119,11 @@
       </a:defRPr>
     </a:lvl9pPr>
   </p:defaultTextStyle>
+  <p:extLst>
+    <p:ext uri="{EFAFB233-063F-42B5-8137-9DF3F51BA10A}">
+      <p15:sldGuideLst xmlns:p15="http://schemas.microsoft.com/office/powerpoint/2012/main"/>
+    </p:ext>
+  </p:extLst>
 </p:presentation>
 </file>
 
@@ -260,7 +274,7 @@
           <a:p>
             <a:fld id="{B9234541-C0A0-4D8A-B866-4FD25DF27ECD}" type="datetimeFigureOut">
               <a:rPr lang="en-US" smtClean="0"/>
-              <a:t>4/27/2024</a:t>
+              <a:t>5/4/2024</a:t>
             </a:fld>
             <a:endParaRPr lang="en-US"/>
           </a:p>
@@ -458,7 +472,7 @@
           <a:p>
             <a:fld id="{B9234541-C0A0-4D8A-B866-4FD25DF27ECD}" type="datetimeFigureOut">
               <a:rPr lang="en-US" smtClean="0"/>
-              <a:t>4/27/2024</a:t>
+              <a:t>5/4/2024</a:t>
             </a:fld>
             <a:endParaRPr lang="en-US"/>
           </a:p>
@@ -666,7 +680,7 @@
           <a:p>
             <a:fld id="{B9234541-C0A0-4D8A-B866-4FD25DF27ECD}" type="datetimeFigureOut">
               <a:rPr lang="en-US" smtClean="0"/>
-              <a:t>4/27/2024</a:t>
+              <a:t>5/4/2024</a:t>
             </a:fld>
             <a:endParaRPr lang="en-US"/>
           </a:p>
@@ -864,7 +878,7 @@
           <a:p>
             <a:fld id="{B9234541-C0A0-4D8A-B866-4FD25DF27ECD}" type="datetimeFigureOut">
               <a:rPr lang="en-US" smtClean="0"/>
-              <a:t>4/27/2024</a:t>
+              <a:t>5/4/2024</a:t>
             </a:fld>
             <a:endParaRPr lang="en-US"/>
           </a:p>
@@ -1139,7 +1153,7 @@
           <a:p>
             <a:fld id="{B9234541-C0A0-4D8A-B866-4FD25DF27ECD}" type="datetimeFigureOut">
               <a:rPr lang="en-US" smtClean="0"/>
-              <a:t>4/27/2024</a:t>
+              <a:t>5/4/2024</a:t>
             </a:fld>
             <a:endParaRPr lang="en-US"/>
           </a:p>
@@ -1404,7 +1418,7 @@
           <a:p>
             <a:fld id="{B9234541-C0A0-4D8A-B866-4FD25DF27ECD}" type="datetimeFigureOut">
               <a:rPr lang="en-US" smtClean="0"/>
-              <a:t>4/27/2024</a:t>
+              <a:t>5/4/2024</a:t>
             </a:fld>
             <a:endParaRPr lang="en-US"/>
           </a:p>
@@ -1816,7 +1830,7 @@
           <a:p>
             <a:fld id="{B9234541-C0A0-4D8A-B866-4FD25DF27ECD}" type="datetimeFigureOut">
               <a:rPr lang="en-US" smtClean="0"/>
-              <a:t>4/27/2024</a:t>
+              <a:t>5/4/2024</a:t>
             </a:fld>
             <a:endParaRPr lang="en-US"/>
           </a:p>
@@ -1957,7 +1971,7 @@
           <a:p>
             <a:fld id="{B9234541-C0A0-4D8A-B866-4FD25DF27ECD}" type="datetimeFigureOut">
               <a:rPr lang="en-US" smtClean="0"/>
-              <a:t>4/27/2024</a:t>
+              <a:t>5/4/2024</a:t>
             </a:fld>
             <a:endParaRPr lang="en-US"/>
           </a:p>
@@ -2070,7 +2084,7 @@
           <a:p>
             <a:fld id="{B9234541-C0A0-4D8A-B866-4FD25DF27ECD}" type="datetimeFigureOut">
               <a:rPr lang="en-US" smtClean="0"/>
-              <a:t>4/27/2024</a:t>
+              <a:t>5/4/2024</a:t>
             </a:fld>
             <a:endParaRPr lang="en-US"/>
           </a:p>
@@ -2381,7 +2395,7 @@
           <a:p>
             <a:fld id="{B9234541-C0A0-4D8A-B866-4FD25DF27ECD}" type="datetimeFigureOut">
               <a:rPr lang="en-US" smtClean="0"/>
-              <a:t>4/27/2024</a:t>
+              <a:t>5/4/2024</a:t>
             </a:fld>
             <a:endParaRPr lang="en-US"/>
           </a:p>
@@ -2669,7 +2683,7 @@
           <a:p>
             <a:fld id="{B9234541-C0A0-4D8A-B866-4FD25DF27ECD}" type="datetimeFigureOut">
               <a:rPr lang="en-US" smtClean="0"/>
-              <a:t>4/27/2024</a:t>
+              <a:t>5/4/2024</a:t>
             </a:fld>
             <a:endParaRPr lang="en-US"/>
           </a:p>
@@ -2910,7 +2924,7 @@
           <a:p>
             <a:fld id="{B9234541-C0A0-4D8A-B866-4FD25DF27ECD}" type="datetimeFigureOut">
               <a:rPr lang="en-US" smtClean="0"/>
-              <a:t>4/27/2024</a:t>
+              <a:t>5/4/2024</a:t>
             </a:fld>
             <a:endParaRPr lang="en-US"/>
           </a:p>
@@ -3398,6 +3412,1187 @@
 </p:sld>
 </file>
 
+<file path=ppt/slides/slide10.xml><?xml version="1.0" encoding="utf-8"?>
+<p:sld xmlns:a="http://schemas.openxmlformats.org/drawingml/2006/main" xmlns:r="http://schemas.openxmlformats.org/officeDocument/2006/relationships" xmlns:p="http://schemas.openxmlformats.org/presentationml/2006/main">
+  <p:cSld>
+    <p:spTree>
+      <p:nvGrpSpPr>
+        <p:cNvPr id="1" name=""/>
+        <p:cNvGrpSpPr/>
+        <p:nvPr/>
+      </p:nvGrpSpPr>
+      <p:grpSpPr>
+        <a:xfrm>
+          <a:off x="0" y="0"/>
+          <a:ext cx="0" cy="0"/>
+          <a:chOff x="0" y="0"/>
+          <a:chExt cx="0" cy="0"/>
+        </a:xfrm>
+      </p:grpSpPr>
+      <p:sp>
+        <p:nvSpPr>
+          <p:cNvPr id="2" name="Title 1">
+            <a:extLst>
+              <a:ext uri="{FF2B5EF4-FFF2-40B4-BE49-F238E27FC236}">
+                <a16:creationId xmlns:a16="http://schemas.microsoft.com/office/drawing/2014/main" id="{8A1A4A51-5E7E-A4BF-F763-8AD11DCF60EB}"/>
+              </a:ext>
+            </a:extLst>
+          </p:cNvPr>
+          <p:cNvSpPr>
+            <a:spLocks noGrp="1"/>
+          </p:cNvSpPr>
+          <p:nvPr>
+            <p:ph type="title"/>
+          </p:nvPr>
+        </p:nvSpPr>
+        <p:spPr/>
+        <p:txBody>
+          <a:bodyPr/>
+          <a:lstStyle/>
+          <a:p>
+            <a:r>
+              <a:rPr lang="en-US" dirty="0"/>
+              <a:t>Library vs. manual implementation</a:t>
+            </a:r>
+          </a:p>
+        </p:txBody>
+      </p:sp>
+      <p:sp>
+        <p:nvSpPr>
+          <p:cNvPr id="3" name="Content Placeholder 2">
+            <a:extLst>
+              <a:ext uri="{FF2B5EF4-FFF2-40B4-BE49-F238E27FC236}">
+                <a16:creationId xmlns:a16="http://schemas.microsoft.com/office/drawing/2014/main" id="{2F9E8054-1259-93E3-07E6-109ACF78FF9A}"/>
+              </a:ext>
+            </a:extLst>
+          </p:cNvPr>
+          <p:cNvSpPr>
+            <a:spLocks noGrp="1"/>
+          </p:cNvSpPr>
+          <p:nvPr>
+            <p:ph idx="1"/>
+          </p:nvPr>
+        </p:nvSpPr>
+        <p:spPr/>
+        <p:txBody>
+          <a:bodyPr/>
+          <a:lstStyle/>
+          <a:p>
+            <a:r>
+              <a:rPr lang="en-US" dirty="0"/>
+              <a:t>Library:</a:t>
+            </a:r>
+          </a:p>
+          <a:p>
+            <a:pPr lvl="1"/>
+            <a:r>
+              <a:rPr lang="en-US" dirty="0"/>
+              <a:t>import torch as </a:t>
+            </a:r>
+            <a:r>
+              <a:rPr lang="en-US" dirty="0" err="1"/>
+              <a:t>nn</a:t>
+            </a:r>
+            <a:r>
+              <a:rPr lang="en-US" dirty="0"/>
+              <a:t>; </a:t>
+            </a:r>
+            <a:r>
+              <a:rPr lang="en-US" dirty="0" err="1"/>
+              <a:t>rnn</a:t>
+            </a:r>
+            <a:r>
+              <a:rPr lang="en-US" dirty="0"/>
+              <a:t>=</a:t>
+            </a:r>
+            <a:r>
+              <a:rPr lang="en-US" dirty="0" err="1"/>
+              <a:t>nn.RNNCell</a:t>
+            </a:r>
+            <a:r>
+              <a:rPr lang="en-US" dirty="0"/>
+              <a:t>(…) # torch provided RNN cell.</a:t>
+            </a:r>
+          </a:p>
+          <a:p>
+            <a:r>
+              <a:rPr lang="en-US" dirty="0"/>
+              <a:t>Manual:</a:t>
+            </a:r>
+          </a:p>
+          <a:p>
+            <a:pPr lvl="1"/>
+            <a:r>
+              <a:rPr lang="en-US" dirty="0"/>
+              <a:t>from </a:t>
+            </a:r>
+            <a:r>
+              <a:rPr lang="en-US" dirty="0" err="1"/>
+              <a:t>common.settings</a:t>
+            </a:r>
+            <a:r>
+              <a:rPr lang="en-US" dirty="0"/>
+              <a:t> import *</a:t>
+            </a:r>
+          </a:p>
+          <a:p>
+            <a:pPr lvl="1"/>
+            <a:r>
+              <a:rPr lang="en-US" dirty="0"/>
+              <a:t>from </a:t>
+            </a:r>
+            <a:r>
+              <a:rPr lang="en-US" dirty="0" err="1"/>
+              <a:t>common.classes</a:t>
+            </a:r>
+            <a:r>
+              <a:rPr lang="en-US" dirty="0"/>
+              <a:t> import *</a:t>
+            </a:r>
+          </a:p>
+          <a:p>
+            <a:pPr lvl="1"/>
+            <a:r>
+              <a:rPr lang="en-US" dirty="0" err="1"/>
+              <a:t>Rnn_cell_manual</a:t>
+            </a:r>
+            <a:r>
+              <a:rPr lang="en-US" dirty="0"/>
+              <a:t>=</a:t>
+            </a:r>
+            <a:r>
+              <a:rPr lang="en-US" dirty="0" err="1"/>
+              <a:t>RNNCell</a:t>
+            </a:r>
+            <a:r>
+              <a:rPr lang="en-US" dirty="0"/>
+              <a:t>(…):</a:t>
+            </a:r>
+          </a:p>
+          <a:p>
+            <a:pPr lvl="2"/>
+            <a:r>
+              <a:rPr lang="en-US" dirty="0"/>
+              <a:t>Init: takes library version of </a:t>
+            </a:r>
+            <a:r>
+              <a:rPr lang="en-US" dirty="0" err="1"/>
+              <a:t>nn.rnnCell</a:t>
+            </a:r>
+            <a:r>
+              <a:rPr lang="en-US" dirty="0"/>
+              <a:t> as input and clones its internal </a:t>
+            </a:r>
+            <a:r>
+              <a:rPr lang="en-US" dirty="0" err="1"/>
+              <a:t>datas</a:t>
+            </a:r>
+            <a:r>
+              <a:rPr lang="en-US" dirty="0"/>
+              <a:t>: weight/bias of two linear layers (for the purposes </a:t>
+            </a:r>
+            <a:r>
+              <a:rPr lang="en-US"/>
+              <a:t>of comparison)</a:t>
+            </a:r>
+          </a:p>
+          <a:p>
+            <a:pPr lvl="2"/>
+            <a:endParaRPr lang="en-US" dirty="0"/>
+          </a:p>
+          <a:p>
+            <a:endParaRPr lang="en-US" dirty="0"/>
+          </a:p>
+        </p:txBody>
+      </p:sp>
+    </p:spTree>
+    <p:extLst>
+      <p:ext uri="{BB962C8B-B14F-4D97-AF65-F5344CB8AC3E}">
+        <p14:creationId xmlns:p14="http://schemas.microsoft.com/office/powerpoint/2010/main" val="33571019"/>
+      </p:ext>
+    </p:extLst>
+  </p:cSld>
+  <p:clrMapOvr>
+    <a:masterClrMapping/>
+  </p:clrMapOvr>
+</p:sld>
+</file>
+
+<file path=ppt/slides/slide11.xml><?xml version="1.0" encoding="utf-8"?>
+<p:sld xmlns:a="http://schemas.openxmlformats.org/drawingml/2006/main" xmlns:r="http://schemas.openxmlformats.org/officeDocument/2006/relationships" xmlns:p="http://schemas.openxmlformats.org/presentationml/2006/main">
+  <p:cSld>
+    <p:spTree>
+      <p:nvGrpSpPr>
+        <p:cNvPr id="1" name=""/>
+        <p:cNvGrpSpPr/>
+        <p:nvPr/>
+      </p:nvGrpSpPr>
+      <p:grpSpPr>
+        <a:xfrm>
+          <a:off x="0" y="0"/>
+          <a:ext cx="0" cy="0"/>
+          <a:chOff x="0" y="0"/>
+          <a:chExt cx="0" cy="0"/>
+        </a:xfrm>
+      </p:grpSpPr>
+      <p:sp>
+        <p:nvSpPr>
+          <p:cNvPr id="2" name="Title 1">
+            <a:extLst>
+              <a:ext uri="{FF2B5EF4-FFF2-40B4-BE49-F238E27FC236}">
+                <a16:creationId xmlns:a16="http://schemas.microsoft.com/office/drawing/2014/main" id="{72C13192-81B3-7CAA-F9D7-09478589E1F7}"/>
+              </a:ext>
+            </a:extLst>
+          </p:cNvPr>
+          <p:cNvSpPr>
+            <a:spLocks noGrp="1"/>
+          </p:cNvSpPr>
+          <p:nvPr>
+            <p:ph type="title"/>
+          </p:nvPr>
+        </p:nvSpPr>
+        <p:spPr/>
+        <p:txBody>
+          <a:bodyPr/>
+          <a:lstStyle/>
+          <a:p>
+            <a:r>
+              <a:rPr lang="en-US" dirty="0"/>
+              <a:t>Conclusion</a:t>
+            </a:r>
+          </a:p>
+        </p:txBody>
+      </p:sp>
+      <p:sp>
+        <p:nvSpPr>
+          <p:cNvPr id="3" name="Content Placeholder 2">
+            <a:extLst>
+              <a:ext uri="{FF2B5EF4-FFF2-40B4-BE49-F238E27FC236}">
+                <a16:creationId xmlns:a16="http://schemas.microsoft.com/office/drawing/2014/main" id="{7E64CE4D-FDC0-1A0C-BC15-A4966CC40FD1}"/>
+              </a:ext>
+            </a:extLst>
+          </p:cNvPr>
+          <p:cNvSpPr>
+            <a:spLocks noGrp="1"/>
+          </p:cNvSpPr>
+          <p:nvPr>
+            <p:ph idx="1"/>
+          </p:nvPr>
+        </p:nvSpPr>
+        <p:spPr/>
+        <p:txBody>
+          <a:bodyPr/>
+          <a:lstStyle/>
+          <a:p>
+            <a:r>
+              <a:rPr lang="en-US" dirty="0"/>
+              <a:t>We fed just a single sample [1,4,2] which is a single rectangle to RNN cell.</a:t>
+            </a:r>
+          </a:p>
+          <a:p>
+            <a:r>
+              <a:rPr lang="en-US" dirty="0"/>
+              <a:t>But wait, we only fed 1</a:t>
+            </a:r>
+            <a:r>
+              <a:rPr lang="en-US" baseline="30000" dirty="0"/>
+              <a:t>st</a:t>
+            </a:r>
+            <a:r>
+              <a:rPr lang="en-US" dirty="0"/>
+              <a:t> corner: </a:t>
+            </a:r>
+          </a:p>
+          <a:p>
+            <a:pPr lvl="1"/>
+            <a:r>
+              <a:rPr lang="en-US" dirty="0"/>
+              <a:t>therefore [1,4,2] =&gt; [4,2] =&gt; [:1, 2] =&gt; [1,2]. </a:t>
+            </a:r>
+          </a:p>
+        </p:txBody>
+      </p:sp>
+    </p:spTree>
+    <p:extLst>
+      <p:ext uri="{BB962C8B-B14F-4D97-AF65-F5344CB8AC3E}">
+        <p14:creationId xmlns:p14="http://schemas.microsoft.com/office/powerpoint/2010/main" val="2660101701"/>
+      </p:ext>
+    </p:extLst>
+  </p:cSld>
+  <p:clrMapOvr>
+    <a:masterClrMapping/>
+  </p:clrMapOvr>
+</p:sld>
+</file>
+
+<file path=ppt/slides/slide12.xml><?xml version="1.0" encoding="utf-8"?>
+<p:sld xmlns:a="http://schemas.openxmlformats.org/drawingml/2006/main" xmlns:r="http://schemas.openxmlformats.org/officeDocument/2006/relationships" xmlns:p="http://schemas.openxmlformats.org/presentationml/2006/main">
+  <p:cSld>
+    <p:spTree>
+      <p:nvGrpSpPr>
+        <p:cNvPr id="1" name=""/>
+        <p:cNvGrpSpPr/>
+        <p:nvPr/>
+      </p:nvGrpSpPr>
+      <p:grpSpPr>
+        <a:xfrm>
+          <a:off x="0" y="0"/>
+          <a:ext cx="0" cy="0"/>
+          <a:chOff x="0" y="0"/>
+          <a:chExt cx="0" cy="0"/>
+        </a:xfrm>
+      </p:grpSpPr>
+      <p:sp>
+        <p:nvSpPr>
+          <p:cNvPr id="2" name="Title 1">
+            <a:extLst>
+              <a:ext uri="{FF2B5EF4-FFF2-40B4-BE49-F238E27FC236}">
+                <a16:creationId xmlns:a16="http://schemas.microsoft.com/office/drawing/2014/main" id="{6DF26A5A-11E1-AFAD-553D-85E5D5E28BE3}"/>
+              </a:ext>
+            </a:extLst>
+          </p:cNvPr>
+          <p:cNvSpPr>
+            <a:spLocks noGrp="1"/>
+          </p:cNvSpPr>
+          <p:nvPr>
+            <p:ph type="title"/>
+          </p:nvPr>
+        </p:nvSpPr>
+        <p:spPr/>
+        <p:txBody>
+          <a:bodyPr/>
+          <a:lstStyle/>
+          <a:p>
+            <a:r>
+              <a:rPr lang="en-US" dirty="0"/>
+              <a:t>Now we feed full sequence</a:t>
+            </a:r>
+          </a:p>
+        </p:txBody>
+      </p:sp>
+      <p:sp>
+        <p:nvSpPr>
+          <p:cNvPr id="3" name="Content Placeholder 2">
+            <a:extLst>
+              <a:ext uri="{FF2B5EF4-FFF2-40B4-BE49-F238E27FC236}">
+                <a16:creationId xmlns:a16="http://schemas.microsoft.com/office/drawing/2014/main" id="{93A369D2-2DD8-4F15-2CA7-96E93C4E6207}"/>
+              </a:ext>
+            </a:extLst>
+          </p:cNvPr>
+          <p:cNvSpPr>
+            <a:spLocks noGrp="1"/>
+          </p:cNvSpPr>
+          <p:nvPr>
+            <p:ph idx="1"/>
+          </p:nvPr>
+        </p:nvSpPr>
+        <p:spPr/>
+        <p:txBody>
+          <a:bodyPr/>
+          <a:lstStyle/>
+          <a:p>
+            <a:r>
+              <a:rPr lang="en-US" dirty="0"/>
+              <a:t>Full sequence: X=[1,4,2]=[4,2]</a:t>
+            </a:r>
+          </a:p>
+          <a:p>
+            <a:r>
+              <a:rPr lang="en-US" dirty="0"/>
+              <a:t>But we don’t do </a:t>
+            </a:r>
+            <a:r>
+              <a:rPr lang="en-US" dirty="0" err="1"/>
+              <a:t>rnn</a:t>
+            </a:r>
+            <a:r>
+              <a:rPr lang="en-US" dirty="0"/>
+              <a:t>(X)</a:t>
+            </a:r>
+          </a:p>
+          <a:p>
+            <a:r>
+              <a:rPr lang="en-US" dirty="0"/>
+              <a:t>Instead:</a:t>
+            </a:r>
+          </a:p>
+          <a:p>
+            <a:pPr lvl="1"/>
+            <a:r>
+              <a:rPr lang="en-US" dirty="0"/>
+              <a:t>For </a:t>
+            </a:r>
+            <a:r>
+              <a:rPr lang="en-US" dirty="0" err="1"/>
+              <a:t>i</a:t>
+            </a:r>
+            <a:r>
+              <a:rPr lang="en-US" dirty="0"/>
+              <a:t> in range (</a:t>
+            </a:r>
+            <a:r>
+              <a:rPr lang="en-US" dirty="0" err="1"/>
+              <a:t>X.shape</a:t>
+            </a:r>
+            <a:r>
+              <a:rPr lang="en-US" dirty="0"/>
+              <a:t>[0]=4): # iterating over first dim of X which is 4.</a:t>
+            </a:r>
+          </a:p>
+          <a:p>
+            <a:pPr lvl="2"/>
+            <a:r>
+              <a:rPr lang="en-US" dirty="0" err="1"/>
+              <a:t>rnn_cell</a:t>
+            </a:r>
+            <a:r>
+              <a:rPr lang="en-US" dirty="0"/>
+              <a:t>( X[</a:t>
+            </a:r>
+            <a:r>
+              <a:rPr lang="en-US" dirty="0" err="1"/>
+              <a:t>i</a:t>
+            </a:r>
+            <a:r>
+              <a:rPr lang="en-US" dirty="0"/>
+              <a:t>] )</a:t>
+            </a:r>
+          </a:p>
+          <a:p>
+            <a:r>
+              <a:rPr lang="en-US" dirty="0"/>
+              <a:t>But this is one at a time.</a:t>
+            </a:r>
+          </a:p>
+          <a:p>
+            <a:r>
+              <a:rPr lang="en-US" dirty="0"/>
+              <a:t>Review back: input:</a:t>
+            </a:r>
+          </a:p>
+          <a:p>
+            <a:pPr lvl="1"/>
+            <a:r>
+              <a:rPr lang="en-US" dirty="0"/>
+              <a:t>254, 4, 2=[samples, corners (sequence), coord (features)</a:t>
+            </a:r>
+          </a:p>
+          <a:p>
+            <a:pPr lvl="1"/>
+            <a:r>
+              <a:rPr lang="en-US" dirty="0"/>
+              <a:t>254, 4, 2=[4-word sentences, words in a sentence, word meaning)</a:t>
+            </a:r>
+          </a:p>
+        </p:txBody>
+      </p:sp>
+    </p:spTree>
+    <p:extLst>
+      <p:ext uri="{BB962C8B-B14F-4D97-AF65-F5344CB8AC3E}">
+        <p14:creationId xmlns:p14="http://schemas.microsoft.com/office/powerpoint/2010/main" val="2270288965"/>
+      </p:ext>
+    </p:extLst>
+  </p:cSld>
+  <p:clrMapOvr>
+    <a:masterClrMapping/>
+  </p:clrMapOvr>
+</p:sld>
+</file>
+
+<file path=ppt/slides/slide13.xml><?xml version="1.0" encoding="utf-8"?>
+<p:sld xmlns:a="http://schemas.openxmlformats.org/drawingml/2006/main" xmlns:r="http://schemas.openxmlformats.org/officeDocument/2006/relationships" xmlns:p="http://schemas.openxmlformats.org/presentationml/2006/main">
+  <p:cSld>
+    <p:spTree>
+      <p:nvGrpSpPr>
+        <p:cNvPr id="1" name=""/>
+        <p:cNvGrpSpPr/>
+        <p:nvPr/>
+      </p:nvGrpSpPr>
+      <p:grpSpPr>
+        <a:xfrm>
+          <a:off x="0" y="0"/>
+          <a:ext cx="0" cy="0"/>
+          <a:chOff x="0" y="0"/>
+          <a:chExt cx="0" cy="0"/>
+        </a:xfrm>
+      </p:grpSpPr>
+      <p:sp>
+        <p:nvSpPr>
+          <p:cNvPr id="2" name="Title 1">
+            <a:extLst>
+              <a:ext uri="{FF2B5EF4-FFF2-40B4-BE49-F238E27FC236}">
+                <a16:creationId xmlns:a16="http://schemas.microsoft.com/office/drawing/2014/main" id="{C28227AB-DAE5-0EA7-388E-2A54A863B141}"/>
+              </a:ext>
+            </a:extLst>
+          </p:cNvPr>
+          <p:cNvSpPr>
+            <a:spLocks noGrp="1"/>
+          </p:cNvSpPr>
+          <p:nvPr>
+            <p:ph type="title"/>
+          </p:nvPr>
+        </p:nvSpPr>
+        <p:spPr/>
+        <p:txBody>
+          <a:bodyPr/>
+          <a:lstStyle/>
+          <a:p>
+            <a:r>
+              <a:rPr lang="en-US" dirty="0"/>
+              <a:t>Batch input</a:t>
+            </a:r>
+          </a:p>
+        </p:txBody>
+      </p:sp>
+      <p:pic>
+        <p:nvPicPr>
+          <p:cNvPr id="7" name="Picture 6">
+            <a:extLst>
+              <a:ext uri="{FF2B5EF4-FFF2-40B4-BE49-F238E27FC236}">
+                <a16:creationId xmlns:a16="http://schemas.microsoft.com/office/drawing/2014/main" id="{3ECBD446-DF2C-C546-4495-FBEA1FC07F70}"/>
+              </a:ext>
+            </a:extLst>
+          </p:cNvPr>
+          <p:cNvPicPr>
+            <a:picLocks noChangeAspect="1"/>
+          </p:cNvPicPr>
+          <p:nvPr/>
+        </p:nvPicPr>
+        <p:blipFill>
+          <a:blip r:embed="rId2"/>
+          <a:stretch>
+            <a:fillRect/>
+          </a:stretch>
+        </p:blipFill>
+        <p:spPr>
+          <a:xfrm>
+            <a:off x="838200" y="4731437"/>
+            <a:ext cx="8963179" cy="1715533"/>
+          </a:xfrm>
+          <a:prstGeom prst="rect">
+            <a:avLst/>
+          </a:prstGeom>
+        </p:spPr>
+      </p:pic>
+      <p:pic>
+        <p:nvPicPr>
+          <p:cNvPr id="9" name="Picture 8">
+            <a:extLst>
+              <a:ext uri="{FF2B5EF4-FFF2-40B4-BE49-F238E27FC236}">
+                <a16:creationId xmlns:a16="http://schemas.microsoft.com/office/drawing/2014/main" id="{887A718A-DE3B-2A49-F331-3F27FCB2FCA5}"/>
+              </a:ext>
+            </a:extLst>
+          </p:cNvPr>
+          <p:cNvPicPr>
+            <a:picLocks noChangeAspect="1"/>
+          </p:cNvPicPr>
+          <p:nvPr/>
+        </p:nvPicPr>
+        <p:blipFill>
+          <a:blip r:embed="rId3"/>
+          <a:stretch>
+            <a:fillRect/>
+          </a:stretch>
+        </p:blipFill>
+        <p:spPr>
+          <a:xfrm>
+            <a:off x="4183711" y="855171"/>
+            <a:ext cx="6686379" cy="3729618"/>
+          </a:xfrm>
+          <a:prstGeom prst="rect">
+            <a:avLst/>
+          </a:prstGeom>
+        </p:spPr>
+      </p:pic>
+    </p:spTree>
+    <p:extLst>
+      <p:ext uri="{BB962C8B-B14F-4D97-AF65-F5344CB8AC3E}">
+        <p14:creationId xmlns:p14="http://schemas.microsoft.com/office/powerpoint/2010/main" val="1127999329"/>
+      </p:ext>
+    </p:extLst>
+  </p:cSld>
+  <p:clrMapOvr>
+    <a:masterClrMapping/>
+  </p:clrMapOvr>
+</p:sld>
+</file>
+
+<file path=ppt/slides/slide14.xml><?xml version="1.0" encoding="utf-8"?>
+<p:sld xmlns:a="http://schemas.openxmlformats.org/drawingml/2006/main" xmlns:r="http://schemas.openxmlformats.org/officeDocument/2006/relationships" xmlns:p="http://schemas.openxmlformats.org/presentationml/2006/main">
+  <p:cSld>
+    <p:spTree>
+      <p:nvGrpSpPr>
+        <p:cNvPr id="1" name=""/>
+        <p:cNvGrpSpPr/>
+        <p:nvPr/>
+      </p:nvGrpSpPr>
+      <p:grpSpPr>
+        <a:xfrm>
+          <a:off x="0" y="0"/>
+          <a:ext cx="0" cy="0"/>
+          <a:chOff x="0" y="0"/>
+          <a:chExt cx="0" cy="0"/>
+        </a:xfrm>
+      </p:grpSpPr>
+      <p:sp>
+        <p:nvSpPr>
+          <p:cNvPr id="2" name="Title 1">
+            <a:extLst>
+              <a:ext uri="{FF2B5EF4-FFF2-40B4-BE49-F238E27FC236}">
+                <a16:creationId xmlns:a16="http://schemas.microsoft.com/office/drawing/2014/main" id="{B31A1067-7243-6828-C80A-BC27C92DBBFB}"/>
+              </a:ext>
+            </a:extLst>
+          </p:cNvPr>
+          <p:cNvSpPr>
+            <a:spLocks noGrp="1"/>
+          </p:cNvSpPr>
+          <p:nvPr>
+            <p:ph type="title"/>
+          </p:nvPr>
+        </p:nvSpPr>
+        <p:spPr/>
+        <p:txBody>
+          <a:bodyPr/>
+          <a:lstStyle/>
+          <a:p>
+            <a:r>
+              <a:rPr lang="en-US" dirty="0"/>
+              <a:t>Batch: inputs..</a:t>
+            </a:r>
+          </a:p>
+        </p:txBody>
+      </p:sp>
+      <p:sp>
+        <p:nvSpPr>
+          <p:cNvPr id="3" name="Content Placeholder 2">
+            <a:extLst>
+              <a:ext uri="{FF2B5EF4-FFF2-40B4-BE49-F238E27FC236}">
+                <a16:creationId xmlns:a16="http://schemas.microsoft.com/office/drawing/2014/main" id="{4AA77A68-723C-0CB7-C52C-E306D39C9402}"/>
+              </a:ext>
+            </a:extLst>
+          </p:cNvPr>
+          <p:cNvSpPr>
+            <a:spLocks noGrp="1"/>
+          </p:cNvSpPr>
+          <p:nvPr>
+            <p:ph idx="1"/>
+          </p:nvPr>
+        </p:nvSpPr>
+        <p:spPr/>
+        <p:txBody>
+          <a:bodyPr>
+            <a:normAutofit/>
+          </a:bodyPr>
+          <a:lstStyle/>
+          <a:p>
+            <a:r>
+              <a:rPr lang="en-US" sz="2400" dirty="0"/>
+              <a:t>But why diagram shows [</a:t>
+            </a:r>
+            <a:r>
+              <a:rPr lang="en-US" sz="2400" dirty="0" err="1"/>
+              <a:t>batch_size</a:t>
+            </a:r>
+            <a:r>
+              <a:rPr lang="en-US" sz="2400" dirty="0"/>
+              <a:t>, </a:t>
+            </a:r>
+            <a:r>
+              <a:rPr lang="en-US" sz="2400" dirty="0" err="1"/>
+              <a:t>input_size</a:t>
+            </a:r>
+            <a:r>
+              <a:rPr lang="en-US" sz="2400" dirty="0"/>
+              <a:t>=features] when input is: [</a:t>
+            </a:r>
+            <a:r>
+              <a:rPr lang="en-US" sz="2400" dirty="0" err="1"/>
+              <a:t>batch_size</a:t>
+            </a:r>
+            <a:r>
+              <a:rPr lang="en-US" sz="2400" dirty="0"/>
+              <a:t>, 4, </a:t>
+            </a:r>
+            <a:r>
+              <a:rPr lang="en-US" sz="2400" dirty="0" err="1"/>
+              <a:t>input_size</a:t>
+            </a:r>
+            <a:r>
+              <a:rPr lang="en-US" sz="2400" dirty="0"/>
+              <a:t>]?</a:t>
+            </a:r>
+          </a:p>
+          <a:p>
+            <a:r>
+              <a:rPr lang="en-US" sz="2400" dirty="0" err="1"/>
+              <a:t>Becaues</a:t>
+            </a:r>
+            <a:r>
+              <a:rPr lang="en-US" sz="2400" dirty="0"/>
+              <a:t> we iterate through 4, that is the essence of sequence… (feeding to cell one corner at a time or in case of LLM feeding one word at a time (to predict next word). If we feed all, this is not sequence!</a:t>
+            </a:r>
+          </a:p>
+          <a:p>
+            <a:r>
+              <a:rPr lang="en-US" sz="2400" dirty="0"/>
+              <a:t>In a nutshell (to alleviate the confusion of feeding one word at a time but sending in batches???)…</a:t>
+            </a:r>
+          </a:p>
+          <a:p>
+            <a:pPr lvl="1"/>
+            <a:r>
+              <a:rPr lang="en-US" sz="2000" dirty="0"/>
+              <a:t>1</a:t>
+            </a:r>
+            <a:r>
+              <a:rPr lang="en-US" sz="2000" baseline="30000" dirty="0"/>
+              <a:t>st</a:t>
+            </a:r>
+            <a:r>
+              <a:rPr lang="en-US" sz="2000" dirty="0"/>
+              <a:t> dim: </a:t>
+            </a:r>
+            <a:r>
+              <a:rPr lang="en-US" sz="2000" dirty="0" err="1"/>
+              <a:t>Batch_size</a:t>
+            </a:r>
+            <a:r>
+              <a:rPr lang="en-US" sz="2000" dirty="0"/>
+              <a:t> = 3 samples (3 rectangles, 3 sentences)</a:t>
+            </a:r>
+          </a:p>
+          <a:p>
+            <a:pPr lvl="1"/>
+            <a:r>
+              <a:rPr lang="en-US" sz="2000" dirty="0"/>
+              <a:t>2</a:t>
+            </a:r>
+            <a:r>
+              <a:rPr lang="en-US" sz="2000" baseline="30000" dirty="0"/>
+              <a:t>nd</a:t>
+            </a:r>
+            <a:r>
+              <a:rPr lang="en-US" sz="2000" dirty="0"/>
+              <a:t> dim: sequence data = 4 (4 corners, one corner at a time, pred. next corner, 4 words in a sentence, one word at a time)</a:t>
+            </a:r>
+          </a:p>
+          <a:p>
+            <a:pPr lvl="1"/>
+            <a:r>
+              <a:rPr lang="en-US" sz="2000" dirty="0"/>
+              <a:t>3</a:t>
+            </a:r>
+            <a:r>
+              <a:rPr lang="en-US" sz="2000" baseline="30000" dirty="0"/>
+              <a:t>rd</a:t>
+            </a:r>
+            <a:r>
+              <a:rPr lang="en-US" sz="2000" dirty="0"/>
+              <a:t> dim: features/</a:t>
+            </a:r>
+            <a:r>
+              <a:rPr lang="en-US" sz="2000" dirty="0" err="1"/>
+              <a:t>input_size</a:t>
+            </a:r>
+            <a:r>
+              <a:rPr lang="en-US" sz="2000" dirty="0"/>
+              <a:t> = 2 (</a:t>
+            </a:r>
+            <a:r>
+              <a:rPr lang="en-US" sz="2000" dirty="0" err="1"/>
+              <a:t>x,y</a:t>
+            </a:r>
+            <a:r>
+              <a:rPr lang="en-US" sz="2000" dirty="0"/>
+              <a:t> coord of corners, encoded value of particular word).</a:t>
+            </a:r>
+          </a:p>
+          <a:p>
+            <a:pPr lvl="1"/>
+            <a:endParaRPr lang="en-US" sz="2000" dirty="0"/>
+          </a:p>
+          <a:p>
+            <a:endParaRPr lang="en-US" sz="2400" dirty="0"/>
+          </a:p>
+          <a:p>
+            <a:endParaRPr lang="en-US" sz="2400" dirty="0"/>
+          </a:p>
+        </p:txBody>
+      </p:sp>
+    </p:spTree>
+    <p:extLst>
+      <p:ext uri="{BB962C8B-B14F-4D97-AF65-F5344CB8AC3E}">
+        <p14:creationId xmlns:p14="http://schemas.microsoft.com/office/powerpoint/2010/main" val="2160269039"/>
+      </p:ext>
+    </p:extLst>
+  </p:cSld>
+  <p:clrMapOvr>
+    <a:masterClrMapping/>
+  </p:clrMapOvr>
+</p:sld>
+</file>
+
+<file path=ppt/slides/slide15.xml><?xml version="1.0" encoding="utf-8"?>
+<p:sld xmlns:a="http://schemas.openxmlformats.org/drawingml/2006/main" xmlns:r="http://schemas.openxmlformats.org/officeDocument/2006/relationships" xmlns:p="http://schemas.openxmlformats.org/presentationml/2006/main">
+  <p:cSld>
+    <p:spTree>
+      <p:nvGrpSpPr>
+        <p:cNvPr id="1" name=""/>
+        <p:cNvGrpSpPr/>
+        <p:nvPr/>
+      </p:nvGrpSpPr>
+      <p:grpSpPr>
+        <a:xfrm>
+          <a:off x="0" y="0"/>
+          <a:ext cx="0" cy="0"/>
+          <a:chOff x="0" y="0"/>
+          <a:chExt cx="0" cy="0"/>
+        </a:xfrm>
+      </p:grpSpPr>
+      <p:sp>
+        <p:nvSpPr>
+          <p:cNvPr id="2" name="Title 1">
+            <a:extLst>
+              <a:ext uri="{FF2B5EF4-FFF2-40B4-BE49-F238E27FC236}">
+                <a16:creationId xmlns:a16="http://schemas.microsoft.com/office/drawing/2014/main" id="{B31A1067-7243-6828-C80A-BC27C92DBBFB}"/>
+              </a:ext>
+            </a:extLst>
+          </p:cNvPr>
+          <p:cNvSpPr>
+            <a:spLocks noGrp="1"/>
+          </p:cNvSpPr>
+          <p:nvPr>
+            <p:ph type="title"/>
+          </p:nvPr>
+        </p:nvSpPr>
+        <p:spPr/>
+        <p:txBody>
+          <a:bodyPr/>
+          <a:lstStyle/>
+          <a:p>
+            <a:r>
+              <a:rPr lang="en-US" dirty="0"/>
+              <a:t>Batch: outputs..</a:t>
+            </a:r>
+          </a:p>
+        </p:txBody>
+      </p:sp>
+      <p:sp>
+        <p:nvSpPr>
+          <p:cNvPr id="3" name="Content Placeholder 2">
+            <a:extLst>
+              <a:ext uri="{FF2B5EF4-FFF2-40B4-BE49-F238E27FC236}">
+                <a16:creationId xmlns:a16="http://schemas.microsoft.com/office/drawing/2014/main" id="{4AA77A68-723C-0CB7-C52C-E306D39C9402}"/>
+              </a:ext>
+            </a:extLst>
+          </p:cNvPr>
+          <p:cNvSpPr>
+            <a:spLocks noGrp="1"/>
+          </p:cNvSpPr>
+          <p:nvPr>
+            <p:ph idx="1"/>
+          </p:nvPr>
+        </p:nvSpPr>
+        <p:spPr/>
+        <p:txBody>
+          <a:bodyPr>
+            <a:normAutofit/>
+          </a:bodyPr>
+          <a:lstStyle/>
+          <a:p>
+            <a:r>
+              <a:rPr lang="en-US" sz="2400" dirty="0"/>
+              <a:t>No batch:</a:t>
+            </a:r>
+          </a:p>
+          <a:p>
+            <a:pPr lvl="1"/>
+            <a:r>
+              <a:rPr lang="en-US" sz="2000" dirty="0"/>
+              <a:t>[1, </a:t>
+            </a:r>
+            <a:r>
+              <a:rPr lang="en-US" sz="2000" dirty="0" err="1"/>
+              <a:t>input_size</a:t>
+            </a:r>
+            <a:r>
+              <a:rPr lang="en-US" sz="2000" dirty="0"/>
+              <a:t>] [</a:t>
+            </a:r>
+            <a:r>
+              <a:rPr lang="en-US" sz="2000" dirty="0" err="1"/>
+              <a:t>hidden_size</a:t>
+            </a:r>
+            <a:r>
+              <a:rPr lang="en-US" sz="2000" dirty="0"/>
+              <a:t>, </a:t>
+            </a:r>
+            <a:r>
+              <a:rPr lang="en-US" sz="2000" dirty="0" err="1"/>
+              <a:t>input_size</a:t>
+            </a:r>
+            <a:r>
+              <a:rPr lang="en-US" sz="2000" dirty="0"/>
+              <a:t>]T = [1, </a:t>
+            </a:r>
+            <a:r>
+              <a:rPr lang="en-US" sz="2000" dirty="0" err="1"/>
+              <a:t>hidden_size</a:t>
+            </a:r>
+            <a:r>
+              <a:rPr lang="en-US" sz="2000" dirty="0"/>
+              <a:t>]</a:t>
+            </a:r>
+          </a:p>
+          <a:p>
+            <a:r>
+              <a:rPr lang="en-US" sz="2400" dirty="0"/>
+              <a:t>Batch (per iteration of sequence)</a:t>
+            </a:r>
+          </a:p>
+          <a:p>
+            <a:pPr lvl="1"/>
+            <a:r>
+              <a:rPr lang="en-US" sz="2000" dirty="0"/>
+              <a:t>[3, </a:t>
+            </a:r>
+            <a:r>
+              <a:rPr lang="en-US" sz="2000" dirty="0" err="1"/>
+              <a:t>input_size</a:t>
+            </a:r>
+            <a:r>
+              <a:rPr lang="en-US" sz="2000" dirty="0"/>
+              <a:t>] [</a:t>
+            </a:r>
+            <a:r>
+              <a:rPr lang="en-US" sz="2000" dirty="0" err="1"/>
+              <a:t>hidden_size</a:t>
+            </a:r>
+            <a:r>
+              <a:rPr lang="en-US" sz="2000" dirty="0"/>
+              <a:t>, </a:t>
+            </a:r>
+            <a:r>
+              <a:rPr lang="en-US" sz="2000" dirty="0" err="1"/>
+              <a:t>input_size</a:t>
+            </a:r>
+            <a:r>
+              <a:rPr lang="en-US" sz="2000" dirty="0"/>
+              <a:t>]T = [3, </a:t>
+            </a:r>
+            <a:r>
+              <a:rPr lang="en-US" sz="2000" dirty="0" err="1"/>
+              <a:t>hidden_size</a:t>
+            </a:r>
+            <a:r>
+              <a:rPr lang="en-US" sz="2000" dirty="0"/>
+              <a:t>]</a:t>
+            </a:r>
+          </a:p>
+          <a:p>
+            <a:pPr lvl="1"/>
+            <a:r>
+              <a:rPr lang="en-US" sz="2000" dirty="0"/>
+              <a:t>What does [3, </a:t>
+            </a:r>
+            <a:r>
+              <a:rPr lang="en-US" sz="2000" dirty="0" err="1"/>
+              <a:t>hidden_size</a:t>
+            </a:r>
+            <a:r>
+              <a:rPr lang="en-US" sz="2000" dirty="0"/>
+              <a:t>] mean?</a:t>
+            </a:r>
+          </a:p>
+          <a:p>
+            <a:pPr lvl="1"/>
+            <a:r>
+              <a:rPr lang="en-US" sz="2000" dirty="0"/>
+              <a:t>State of RNN cell at a particular iteration of corner (word) that helps to predict next corner (word), 3 rectangles at a time (3 sentences at a time).</a:t>
+            </a:r>
+          </a:p>
+          <a:p>
+            <a:pPr lvl="1"/>
+            <a:endParaRPr lang="en-US" sz="2000" dirty="0"/>
+          </a:p>
+        </p:txBody>
+      </p:sp>
+    </p:spTree>
+    <p:extLst>
+      <p:ext uri="{BB962C8B-B14F-4D97-AF65-F5344CB8AC3E}">
+        <p14:creationId xmlns:p14="http://schemas.microsoft.com/office/powerpoint/2010/main" val="1840528226"/>
+      </p:ext>
+    </p:extLst>
+  </p:cSld>
+  <p:clrMapOvr>
+    <a:masterClrMapping/>
+  </p:clrMapOvr>
+</p:sld>
+</file>
+
+<file path=ppt/slides/slide16.xml><?xml version="1.0" encoding="utf-8"?>
+<p:sld xmlns:a="http://schemas.openxmlformats.org/drawingml/2006/main" xmlns:r="http://schemas.openxmlformats.org/officeDocument/2006/relationships" xmlns:p="http://schemas.openxmlformats.org/presentationml/2006/main">
+  <p:cSld>
+    <p:spTree>
+      <p:nvGrpSpPr>
+        <p:cNvPr id="1" name=""/>
+        <p:cNvGrpSpPr/>
+        <p:nvPr/>
+      </p:nvGrpSpPr>
+      <p:grpSpPr>
+        <a:xfrm>
+          <a:off x="0" y="0"/>
+          <a:ext cx="0" cy="0"/>
+          <a:chOff x="0" y="0"/>
+          <a:chExt cx="0" cy="0"/>
+        </a:xfrm>
+      </p:grpSpPr>
+      <p:sp>
+        <p:nvSpPr>
+          <p:cNvPr id="2" name="Title 1">
+            <a:extLst>
+              <a:ext uri="{FF2B5EF4-FFF2-40B4-BE49-F238E27FC236}">
+                <a16:creationId xmlns:a16="http://schemas.microsoft.com/office/drawing/2014/main" id="{A2A4F26C-DE3F-DB65-2F45-4520849F5F9F}"/>
+              </a:ext>
+            </a:extLst>
+          </p:cNvPr>
+          <p:cNvSpPr>
+            <a:spLocks noGrp="1"/>
+          </p:cNvSpPr>
+          <p:nvPr>
+            <p:ph type="title"/>
+          </p:nvPr>
+        </p:nvSpPr>
+        <p:spPr/>
+        <p:txBody>
+          <a:bodyPr/>
+          <a:lstStyle/>
+          <a:p>
+            <a:r>
+              <a:rPr lang="en-US" dirty="0"/>
+              <a:t>Bit about </a:t>
+            </a:r>
+            <a:r>
+              <a:rPr lang="en-US" dirty="0" err="1"/>
+              <a:t>batch_first</a:t>
+            </a:r>
+            <a:r>
+              <a:rPr lang="en-US" dirty="0"/>
+              <a:t> parameter</a:t>
+            </a:r>
+          </a:p>
+        </p:txBody>
+      </p:sp>
+      <p:sp>
+        <p:nvSpPr>
+          <p:cNvPr id="3" name="Content Placeholder 2">
+            <a:extLst>
+              <a:ext uri="{FF2B5EF4-FFF2-40B4-BE49-F238E27FC236}">
+                <a16:creationId xmlns:a16="http://schemas.microsoft.com/office/drawing/2014/main" id="{89780740-5244-F8FE-F79E-6B85C7195F33}"/>
+              </a:ext>
+            </a:extLst>
+          </p:cNvPr>
+          <p:cNvSpPr>
+            <a:spLocks noGrp="1"/>
+          </p:cNvSpPr>
+          <p:nvPr>
+            <p:ph idx="1"/>
+          </p:nvPr>
+        </p:nvSpPr>
+        <p:spPr/>
+        <p:txBody>
+          <a:bodyPr/>
+          <a:lstStyle/>
+          <a:p>
+            <a:r>
+              <a:rPr lang="en-US" dirty="0" err="1"/>
+              <a:t>Defaut</a:t>
+            </a:r>
+            <a:r>
+              <a:rPr lang="en-US" dirty="0"/>
+              <a:t> input at RNN: [L,N,F]=[</a:t>
+            </a:r>
+            <a:r>
+              <a:rPr lang="en-US" dirty="0" err="1"/>
+              <a:t>seq.length</a:t>
+            </a:r>
+            <a:r>
+              <a:rPr lang="en-US" dirty="0"/>
+              <a:t>, batch, features]</a:t>
+            </a:r>
+          </a:p>
+          <a:p>
+            <a:r>
+              <a:rPr lang="en-US" dirty="0"/>
+              <a:t>Actual input: [batch, </a:t>
+            </a:r>
+            <a:r>
+              <a:rPr lang="en-US" dirty="0" err="1"/>
+              <a:t>seq.length</a:t>
+            </a:r>
+            <a:r>
+              <a:rPr lang="en-US" dirty="0"/>
+              <a:t>, features] = [N,L,F]</a:t>
+            </a:r>
+          </a:p>
+          <a:p>
+            <a:r>
+              <a:rPr lang="en-US" dirty="0"/>
+              <a:t>Option 1: permute input before feeding into RNN cell:</a:t>
+            </a:r>
+          </a:p>
+          <a:p>
+            <a:pPr lvl="1"/>
+            <a:r>
+              <a:rPr lang="en-US" dirty="0"/>
+              <a:t>[N,L,F]-&gt;[L,N,F]</a:t>
+            </a:r>
+          </a:p>
+          <a:p>
+            <a:r>
+              <a:rPr lang="en-US" dirty="0"/>
+              <a:t>Option 2:</a:t>
+            </a:r>
+          </a:p>
+          <a:p>
+            <a:pPr lvl="1"/>
+            <a:r>
+              <a:rPr lang="en-US" dirty="0"/>
+              <a:t>Use </a:t>
+            </a:r>
+            <a:r>
+              <a:rPr lang="en-US" dirty="0" err="1"/>
+              <a:t>batch_first</a:t>
+            </a:r>
+            <a:r>
+              <a:rPr lang="en-US" dirty="0"/>
+              <a:t> parameter so that RNN cell accepts input as non-default shape: [N,L,F] = [batch, seq. length</a:t>
+            </a:r>
+            <a:r>
+              <a:rPr lang="en-US"/>
+              <a:t>, features]</a:t>
+            </a:r>
+            <a:endParaRPr lang="en-US" dirty="0"/>
+          </a:p>
+          <a:p>
+            <a:pPr lvl="2"/>
+            <a:endParaRPr lang="en-US" dirty="0"/>
+          </a:p>
+        </p:txBody>
+      </p:sp>
+    </p:spTree>
+    <p:extLst>
+      <p:ext uri="{BB962C8B-B14F-4D97-AF65-F5344CB8AC3E}">
+        <p14:creationId xmlns:p14="http://schemas.microsoft.com/office/powerpoint/2010/main" val="947865986"/>
+      </p:ext>
+    </p:extLst>
+  </p:cSld>
+  <p:clrMapOvr>
+    <a:masterClrMapping/>
+  </p:clrMapOvr>
+</p:sld>
+</file>
+
 <file path=ppt/slides/slide2.xml><?xml version="1.0" encoding="utf-8"?>
 <p:sld xmlns:a="http://schemas.openxmlformats.org/drawingml/2006/main" xmlns:r="http://schemas.openxmlformats.org/officeDocument/2006/relationships" xmlns:p="http://schemas.openxmlformats.org/presentationml/2006/main">
   <p:cSld>
@@ -3554,12 +4749,21 @@
         </p:nvSpPr>
         <p:spPr/>
         <p:txBody>
-          <a:bodyPr/>
-          <a:lstStyle/>
-          <a:p>
-            <a:r>
-              <a:rPr lang="en-US" dirty="0"/>
-              <a:t>RNN	</a:t>
+          <a:bodyPr>
+            <a:normAutofit/>
+          </a:bodyPr>
+          <a:lstStyle/>
+          <a:p>
+            <a:pPr algn="ctr"/>
+            <a:r>
+              <a:rPr lang="en-US" sz="6600" b="1" dirty="0">
+                <a:solidFill>
+                  <a:schemeClr val="accent5">
+                    <a:lumMod val="75000"/>
+                  </a:schemeClr>
+                </a:solidFill>
+              </a:rPr>
+              <a:t>RNN</a:t>
             </a:r>
           </a:p>
         </p:txBody>
@@ -3689,7 +4893,7 @@
           <p:cNvPr id="2" name="Title 1">
             <a:extLst>
               <a:ext uri="{FF2B5EF4-FFF2-40B4-BE49-F238E27FC236}">
-                <a16:creationId xmlns:a16="http://schemas.microsoft.com/office/drawing/2014/main" id="{F4B83C86-8760-6589-B1ED-0259C477A4F5}"/>
+                <a16:creationId xmlns:a16="http://schemas.microsoft.com/office/drawing/2014/main" id="{A0AB0580-E6FF-DA49-008A-CD04B727F0FB}"/>
               </a:ext>
             </a:extLst>
           </p:cNvPr>
@@ -3707,276 +4911,277 @@
           <a:p>
             <a:r>
               <a:rPr lang="en-US" dirty="0"/>
-              <a:t>RNN cell	</a:t>
-            </a:r>
-          </a:p>
-        </p:txBody>
-      </p:sp>
-      <p:sp>
-        <p:nvSpPr>
-          <p:cNvPr id="3" name="Content Placeholder 2">
-            <a:extLst>
-              <a:ext uri="{FF2B5EF4-FFF2-40B4-BE49-F238E27FC236}">
-                <a16:creationId xmlns:a16="http://schemas.microsoft.com/office/drawing/2014/main" id="{1F3D5939-8CC4-0ADA-04B5-207D7BD5EFF6}"/>
-              </a:ext>
-            </a:extLst>
-          </p:cNvPr>
-          <p:cNvSpPr>
-            <a:spLocks noGrp="1"/>
-          </p:cNvSpPr>
-          <p:nvPr>
-            <p:ph idx="1"/>
-          </p:nvPr>
-        </p:nvSpPr>
+              <a:t>Our data (not only RNN, throughout series)</a:t>
+            </a:r>
+          </a:p>
+        </p:txBody>
+      </p:sp>
+      <p:pic>
+        <p:nvPicPr>
+          <p:cNvPr id="7" name="Picture 6">
+            <a:extLst>
+              <a:ext uri="{FF2B5EF4-FFF2-40B4-BE49-F238E27FC236}">
+                <a16:creationId xmlns:a16="http://schemas.microsoft.com/office/drawing/2014/main" id="{56BFA214-E81A-0D03-1B94-030FD4780753}"/>
+              </a:ext>
+            </a:extLst>
+          </p:cNvPr>
+          <p:cNvPicPr>
+            <a:picLocks noChangeAspect="1"/>
+          </p:cNvPicPr>
+          <p:nvPr/>
+        </p:nvPicPr>
+        <p:blipFill>
+          <a:blip r:embed="rId2"/>
+          <a:stretch>
+            <a:fillRect/>
+          </a:stretch>
+        </p:blipFill>
         <p:spPr>
           <a:xfrm>
-            <a:off x="838200" y="1825625"/>
-            <a:ext cx="10515600" cy="4667250"/>
+            <a:off x="1612982" y="1690688"/>
+            <a:ext cx="8088572" cy="1150375"/>
           </a:xfrm>
+          <a:prstGeom prst="rect">
+            <a:avLst/>
+          </a:prstGeom>
         </p:spPr>
-        <p:txBody>
-          <a:bodyPr>
-            <a:normAutofit/>
-          </a:bodyPr>
-          <a:lstStyle/>
-          <a:p>
-            <a:r>
-              <a:rPr lang="en-US" dirty="0"/>
-              <a:t>Containing 2 linear layers:</a:t>
-            </a:r>
-          </a:p>
-          <a:p>
-            <a:pPr lvl="1"/>
-            <a:r>
-              <a:rPr lang="en-US" dirty="0" err="1"/>
-              <a:t>Input_layer</a:t>
-            </a:r>
-            <a:r>
-              <a:rPr lang="en-US" dirty="0"/>
-              <a:t>: in: [1,input_size=</a:t>
-            </a:r>
-            <a:r>
-              <a:rPr lang="en-US" dirty="0" err="1"/>
-              <a:t>n_features</a:t>
-            </a:r>
-            <a:r>
-              <a:rPr lang="en-US" dirty="0"/>
-              <a:t>], out: [1, </a:t>
-            </a:r>
-            <a:r>
-              <a:rPr lang="en-US" dirty="0" err="1"/>
-              <a:t>hidden_dim</a:t>
-            </a:r>
-            <a:r>
-              <a:rPr lang="en-US" dirty="0"/>
-              <a:t>=</a:t>
-            </a:r>
-            <a:r>
-              <a:rPr lang="en-US" dirty="0" err="1"/>
-              <a:t>hidden_size</a:t>
-            </a:r>
-            <a:r>
-              <a:rPr lang="en-US" dirty="0"/>
-              <a:t>]</a:t>
-            </a:r>
-          </a:p>
-          <a:p>
-            <a:pPr lvl="1"/>
-            <a:r>
-              <a:rPr lang="en-US" dirty="0" err="1"/>
-              <a:t>Hidden_layer</a:t>
-            </a:r>
-            <a:r>
-              <a:rPr lang="en-US" dirty="0"/>
-              <a:t>: in: [1, </a:t>
-            </a:r>
-            <a:r>
-              <a:rPr lang="en-US" dirty="0" err="1"/>
-              <a:t>hidden_dim</a:t>
-            </a:r>
-            <a:r>
-              <a:rPr lang="en-US" dirty="0"/>
-              <a:t>], out: [1, </a:t>
-            </a:r>
-            <a:r>
-              <a:rPr lang="en-US" dirty="0" err="1"/>
-              <a:t>hidden_dim</a:t>
-            </a:r>
-            <a:r>
-              <a:rPr lang="en-US" dirty="0"/>
-              <a:t>].</a:t>
-            </a:r>
-          </a:p>
-          <a:p>
-            <a:pPr lvl="1"/>
-            <a:r>
-              <a:rPr lang="en-US" dirty="0"/>
-              <a:t>Weights [</a:t>
-            </a:r>
-            <a:r>
-              <a:rPr lang="en-US" dirty="0" err="1"/>
-              <a:t>hidden_size</a:t>
-            </a:r>
-            <a:r>
-              <a:rPr lang="en-US" dirty="0"/>
-              <a:t>, </a:t>
-            </a:r>
-            <a:r>
-              <a:rPr lang="en-US" dirty="0" err="1"/>
-              <a:t>input_size</a:t>
-            </a:r>
-            <a:r>
-              <a:rPr lang="en-US" dirty="0"/>
-              <a:t>]</a:t>
-            </a:r>
-          </a:p>
-          <a:p>
-            <a:pPr lvl="1"/>
-            <a:r>
-              <a:rPr lang="en-US" dirty="0"/>
-              <a:t>What happens in forward() [aka: predict, inference]:</a:t>
-            </a:r>
-          </a:p>
-          <a:p>
-            <a:pPr lvl="2"/>
-            <a:r>
-              <a:rPr lang="en-US" dirty="0" err="1"/>
-              <a:t>Matmul</a:t>
-            </a:r>
-            <a:r>
-              <a:rPr lang="en-US" dirty="0"/>
-              <a:t> (&lt;input&gt;, &lt;weights&gt;] </a:t>
-            </a:r>
-          </a:p>
-          <a:p>
-            <a:pPr lvl="1"/>
-            <a:r>
-              <a:rPr lang="en-US" dirty="0"/>
-              <a:t>How about dimensions?</a:t>
-            </a:r>
-          </a:p>
-          <a:p>
-            <a:pPr lvl="2"/>
-            <a:r>
-              <a:rPr lang="en-US" dirty="0" err="1"/>
-              <a:t>Matmul</a:t>
-            </a:r>
-            <a:r>
-              <a:rPr lang="en-US" dirty="0"/>
-              <a:t>( [1, </a:t>
-            </a:r>
-            <a:r>
-              <a:rPr lang="en-US" dirty="0" err="1"/>
-              <a:t>input_size</a:t>
-            </a:r>
-            <a:r>
-              <a:rPr lang="en-US" dirty="0"/>
-              <a:t>][</a:t>
-            </a:r>
-            <a:r>
-              <a:rPr lang="en-US" dirty="0" err="1"/>
-              <a:t>hidden_size</a:t>
-            </a:r>
-            <a:r>
-              <a:rPr lang="en-US" dirty="0"/>
-              <a:t>, </a:t>
-            </a:r>
-            <a:r>
-              <a:rPr lang="en-US" dirty="0" err="1"/>
-              <a:t>input_size</a:t>
-            </a:r>
-            <a:r>
-              <a:rPr lang="en-US" dirty="0"/>
-              <a:t>] ??? But isn’t :</a:t>
-            </a:r>
-          </a:p>
-          <a:p>
-            <a:pPr lvl="2"/>
-            <a:r>
-              <a:rPr lang="en-US" dirty="0" err="1"/>
-              <a:t>Matmul</a:t>
-            </a:r>
-            <a:r>
-              <a:rPr lang="en-US" dirty="0"/>
-              <a:t> ( [N,M], [M,K] ) =&gt; [N,K].</a:t>
-            </a:r>
-          </a:p>
-          <a:p>
-            <a:pPr lvl="2"/>
-            <a:r>
-              <a:rPr lang="en-US" dirty="0"/>
-              <a:t>Answer (weight is transposed):</a:t>
-            </a:r>
-          </a:p>
-          <a:p>
-            <a:pPr lvl="2"/>
-            <a:r>
-              <a:rPr lang="en-US" dirty="0" err="1"/>
-              <a:t>Matmul</a:t>
-            </a:r>
-            <a:r>
-              <a:rPr lang="en-US" dirty="0"/>
-              <a:t>( [1, </a:t>
-            </a:r>
-            <a:r>
-              <a:rPr lang="en-US" dirty="0" err="1"/>
-              <a:t>input_size</a:t>
-            </a:r>
-            <a:r>
-              <a:rPr lang="en-US" dirty="0"/>
-              <a:t>][</a:t>
-            </a:r>
-            <a:r>
-              <a:rPr lang="en-US" dirty="0" err="1"/>
-              <a:t>input_size</a:t>
-            </a:r>
-            <a:r>
-              <a:rPr lang="en-US" dirty="0"/>
-              <a:t>, </a:t>
-            </a:r>
-            <a:r>
-              <a:rPr lang="en-US" dirty="0" err="1"/>
-              <a:t>hidden_size</a:t>
-            </a:r>
-            <a:r>
-              <a:rPr lang="en-US" dirty="0"/>
-              <a:t>] =&gt; [1, </a:t>
-            </a:r>
-            <a:r>
-              <a:rPr lang="en-US" dirty="0" err="1"/>
-              <a:t>hidden_size</a:t>
-            </a:r>
-            <a:r>
-              <a:rPr lang="en-US" dirty="0"/>
-              <a:t>] (output and also feedback to </a:t>
-            </a:r>
-            <a:r>
-              <a:rPr lang="en-US" dirty="0" err="1"/>
-              <a:t>hidden_layer</a:t>
-            </a:r>
-            <a:r>
-              <a:rPr lang="en-US" dirty="0"/>
-              <a:t>)</a:t>
-            </a:r>
-          </a:p>
-          <a:p>
-            <a:pPr lvl="2"/>
-            <a:endParaRPr lang="en-US" dirty="0"/>
-          </a:p>
-          <a:p>
-            <a:pPr lvl="2"/>
-            <a:endParaRPr lang="en-US" dirty="0"/>
-          </a:p>
-          <a:p>
-            <a:pPr lvl="1"/>
-            <a:endParaRPr lang="en-US" dirty="0"/>
+      </p:pic>
+      <p:sp>
+        <p:nvSpPr>
+          <p:cNvPr id="8" name="Parallelogram 7">
+            <a:extLst>
+              <a:ext uri="{FF2B5EF4-FFF2-40B4-BE49-F238E27FC236}">
+                <a16:creationId xmlns:a16="http://schemas.microsoft.com/office/drawing/2014/main" id="{678A24D6-969E-6AAA-E24B-A5C66C88ABC8}"/>
+              </a:ext>
+            </a:extLst>
+          </p:cNvPr>
+          <p:cNvSpPr/>
+          <p:nvPr/>
+        </p:nvSpPr>
+        <p:spPr>
+          <a:xfrm>
+            <a:off x="1684692" y="3242394"/>
+            <a:ext cx="1071716" cy="904568"/>
+          </a:xfrm>
+          <a:prstGeom prst="parallelogram">
+            <a:avLst/>
+          </a:prstGeom>
+        </p:spPr>
+        <p:style>
+          <a:lnRef idx="2">
+            <a:schemeClr val="accent1">
+              <a:shade val="15000"/>
+            </a:schemeClr>
+          </a:lnRef>
+          <a:fillRef idx="1">
+            <a:schemeClr val="accent1"/>
+          </a:fillRef>
+          <a:effectRef idx="0">
+            <a:schemeClr val="accent1"/>
+          </a:effectRef>
+          <a:fontRef idx="minor">
+            <a:schemeClr val="lt1"/>
+          </a:fontRef>
+        </p:style>
+        <p:txBody>
+          <a:bodyPr rtlCol="0" anchor="ctr"/>
+          <a:lstStyle/>
+          <a:p>
+            <a:pPr algn="ctr"/>
+            <a:endParaRPr lang="en-US"/>
+          </a:p>
+        </p:txBody>
+      </p:sp>
+      <p:sp>
+        <p:nvSpPr>
+          <p:cNvPr id="9" name="Rectangle: Top Corners Rounded 8">
+            <a:extLst>
+              <a:ext uri="{FF2B5EF4-FFF2-40B4-BE49-F238E27FC236}">
+                <a16:creationId xmlns:a16="http://schemas.microsoft.com/office/drawing/2014/main" id="{C0526A4F-9A75-6820-8E86-CA9330F84B26}"/>
+              </a:ext>
+            </a:extLst>
+          </p:cNvPr>
+          <p:cNvSpPr/>
+          <p:nvPr/>
+        </p:nvSpPr>
+        <p:spPr>
+          <a:xfrm>
+            <a:off x="3130034" y="3242394"/>
+            <a:ext cx="1071716" cy="688258"/>
+          </a:xfrm>
+          <a:prstGeom prst="round2SameRect">
+            <a:avLst/>
+          </a:prstGeom>
+        </p:spPr>
+        <p:style>
+          <a:lnRef idx="2">
+            <a:schemeClr val="accent1">
+              <a:shade val="15000"/>
+            </a:schemeClr>
+          </a:lnRef>
+          <a:fillRef idx="1">
+            <a:schemeClr val="accent1"/>
+          </a:fillRef>
+          <a:effectRef idx="0">
+            <a:schemeClr val="accent1"/>
+          </a:effectRef>
+          <a:fontRef idx="minor">
+            <a:schemeClr val="lt1"/>
+          </a:fontRef>
+        </p:style>
+        <p:txBody>
+          <a:bodyPr rtlCol="0" anchor="ctr"/>
+          <a:lstStyle/>
+          <a:p>
+            <a:pPr algn="ctr"/>
+            <a:endParaRPr lang="en-US"/>
+          </a:p>
+        </p:txBody>
+      </p:sp>
+      <p:sp>
+        <p:nvSpPr>
+          <p:cNvPr id="10" name="Diamond 9">
+            <a:extLst>
+              <a:ext uri="{FF2B5EF4-FFF2-40B4-BE49-F238E27FC236}">
+                <a16:creationId xmlns:a16="http://schemas.microsoft.com/office/drawing/2014/main" id="{66D057C7-1FE9-CB54-FBB3-EA06374678D7}"/>
+              </a:ext>
+            </a:extLst>
+          </p:cNvPr>
+          <p:cNvSpPr/>
+          <p:nvPr/>
+        </p:nvSpPr>
+        <p:spPr>
+          <a:xfrm>
+            <a:off x="4772021" y="3242394"/>
+            <a:ext cx="1150374" cy="904568"/>
+          </a:xfrm>
+          <a:prstGeom prst="diamond">
+            <a:avLst/>
+          </a:prstGeom>
+        </p:spPr>
+        <p:style>
+          <a:lnRef idx="2">
+            <a:schemeClr val="accent1">
+              <a:shade val="15000"/>
+            </a:schemeClr>
+          </a:lnRef>
+          <a:fillRef idx="1">
+            <a:schemeClr val="accent1"/>
+          </a:fillRef>
+          <a:effectRef idx="0">
+            <a:schemeClr val="accent1"/>
+          </a:effectRef>
+          <a:fontRef idx="minor">
+            <a:schemeClr val="lt1"/>
+          </a:fontRef>
+        </p:style>
+        <p:txBody>
+          <a:bodyPr rtlCol="0" anchor="ctr"/>
+          <a:lstStyle/>
+          <a:p>
+            <a:pPr algn="ctr"/>
+            <a:endParaRPr lang="en-US"/>
+          </a:p>
+        </p:txBody>
+      </p:sp>
+      <p:sp>
+        <p:nvSpPr>
+          <p:cNvPr id="11" name="Parallelogram 10">
+            <a:extLst>
+              <a:ext uri="{FF2B5EF4-FFF2-40B4-BE49-F238E27FC236}">
+                <a16:creationId xmlns:a16="http://schemas.microsoft.com/office/drawing/2014/main" id="{871EB745-DEE8-78BC-E421-638CB4B195FF}"/>
+              </a:ext>
+            </a:extLst>
+          </p:cNvPr>
+          <p:cNvSpPr/>
+          <p:nvPr/>
+        </p:nvSpPr>
+        <p:spPr>
+          <a:xfrm flipH="1">
+            <a:off x="6217363" y="3129784"/>
+            <a:ext cx="1366683" cy="1150374"/>
+          </a:xfrm>
+          <a:prstGeom prst="parallelogram">
+            <a:avLst>
+              <a:gd name="adj" fmla="val 47222"/>
+            </a:avLst>
+          </a:prstGeom>
+        </p:spPr>
+        <p:style>
+          <a:lnRef idx="2">
+            <a:schemeClr val="accent1">
+              <a:shade val="15000"/>
+            </a:schemeClr>
+          </a:lnRef>
+          <a:fillRef idx="1">
+            <a:schemeClr val="accent1"/>
+          </a:fillRef>
+          <a:effectRef idx="0">
+            <a:schemeClr val="accent1"/>
+          </a:effectRef>
+          <a:fontRef idx="minor">
+            <a:schemeClr val="lt1"/>
+          </a:fontRef>
+        </p:style>
+        <p:txBody>
+          <a:bodyPr rtlCol="0" anchor="ctr"/>
+          <a:lstStyle/>
+          <a:p>
+            <a:pPr algn="ctr"/>
+            <a:endParaRPr lang="en-US"/>
+          </a:p>
+        </p:txBody>
+      </p:sp>
+      <p:sp>
+        <p:nvSpPr>
+          <p:cNvPr id="12" name="Trapezoid 11">
+            <a:extLst>
+              <a:ext uri="{FF2B5EF4-FFF2-40B4-BE49-F238E27FC236}">
+                <a16:creationId xmlns:a16="http://schemas.microsoft.com/office/drawing/2014/main" id="{A3A781F4-F7AE-ED69-1189-60E1C1D7B716}"/>
+              </a:ext>
+            </a:extLst>
+          </p:cNvPr>
+          <p:cNvSpPr/>
+          <p:nvPr/>
+        </p:nvSpPr>
+        <p:spPr>
+          <a:xfrm>
+            <a:off x="8095324" y="3262058"/>
+            <a:ext cx="1504335" cy="904568"/>
+          </a:xfrm>
+          <a:prstGeom prst="trapezoid">
+            <a:avLst/>
+          </a:prstGeom>
+        </p:spPr>
+        <p:style>
+          <a:lnRef idx="2">
+            <a:schemeClr val="accent1">
+              <a:shade val="15000"/>
+            </a:schemeClr>
+          </a:lnRef>
+          <a:fillRef idx="1">
+            <a:schemeClr val="accent1"/>
+          </a:fillRef>
+          <a:effectRef idx="0">
+            <a:schemeClr val="accent1"/>
+          </a:effectRef>
+          <a:fontRef idx="minor">
+            <a:schemeClr val="lt1"/>
+          </a:fontRef>
+        </p:style>
+        <p:txBody>
+          <a:bodyPr rtlCol="0" anchor="ctr"/>
+          <a:lstStyle/>
+          <a:p>
+            <a:pPr algn="ctr"/>
+            <a:endParaRPr lang="en-US"/>
           </a:p>
         </p:txBody>
       </p:sp>
     </p:spTree>
     <p:extLst>
       <p:ext uri="{BB962C8B-B14F-4D97-AF65-F5344CB8AC3E}">
-        <p14:creationId xmlns:p14="http://schemas.microsoft.com/office/powerpoint/2010/main" val="3287707793"/>
+        <p14:creationId xmlns:p14="http://schemas.microsoft.com/office/powerpoint/2010/main" val="3404551272"/>
       </p:ext>
     </p:extLst>
   </p:cSld>
@@ -4008,7 +5213,7 @@
           <p:cNvPr id="2" name="Title 1">
             <a:extLst>
               <a:ext uri="{FF2B5EF4-FFF2-40B4-BE49-F238E27FC236}">
-                <a16:creationId xmlns:a16="http://schemas.microsoft.com/office/drawing/2014/main" id="{F4B83C86-8760-6589-B1ED-0259C477A4F5}"/>
+                <a16:creationId xmlns:a16="http://schemas.microsoft.com/office/drawing/2014/main" id="{C7D6CBD9-7B8A-2481-B086-2CBCDA2D24F5}"/>
               </a:ext>
             </a:extLst>
           </p:cNvPr>
@@ -4026,177 +5231,86 @@
           <a:p>
             <a:r>
               <a:rPr lang="en-US" dirty="0"/>
-              <a:t>RNN cell	</a:t>
-            </a:r>
-          </a:p>
-        </p:txBody>
-      </p:sp>
-      <p:sp>
-        <p:nvSpPr>
-          <p:cNvPr id="3" name="Content Placeholder 2">
-            <a:extLst>
-              <a:ext uri="{FF2B5EF4-FFF2-40B4-BE49-F238E27FC236}">
-                <a16:creationId xmlns:a16="http://schemas.microsoft.com/office/drawing/2014/main" id="{1F3D5939-8CC4-0ADA-04B5-207D7BD5EFF6}"/>
-              </a:ext>
-            </a:extLst>
-          </p:cNvPr>
-          <p:cNvSpPr>
-            <a:spLocks noGrp="1"/>
-          </p:cNvSpPr>
-          <p:nvPr>
-            <p:ph idx="1"/>
-          </p:nvPr>
-        </p:nvSpPr>
+              <a:t>How our data resembles language  problem?</a:t>
+            </a:r>
+          </a:p>
+        </p:txBody>
+      </p:sp>
+      <p:pic>
+        <p:nvPicPr>
+          <p:cNvPr id="5" name="Picture 4">
+            <a:extLst>
+              <a:ext uri="{FF2B5EF4-FFF2-40B4-BE49-F238E27FC236}">
+                <a16:creationId xmlns:a16="http://schemas.microsoft.com/office/drawing/2014/main" id="{CDB7E86A-9EF7-920F-2423-0BB050A4B939}"/>
+              </a:ext>
+            </a:extLst>
+          </p:cNvPr>
+          <p:cNvPicPr>
+            <a:picLocks noChangeAspect="1"/>
+          </p:cNvPicPr>
+          <p:nvPr/>
+        </p:nvPicPr>
+        <p:blipFill>
+          <a:blip r:embed="rId2"/>
+          <a:stretch>
+            <a:fillRect/>
+          </a:stretch>
+        </p:blipFill>
         <p:spPr>
           <a:xfrm>
-            <a:off x="838200" y="1825625"/>
-            <a:ext cx="10515600" cy="4667250"/>
+            <a:off x="3013710" y="1465672"/>
+            <a:ext cx="6742966" cy="5016910"/>
           </a:xfrm>
+          <a:prstGeom prst="rect">
+            <a:avLst/>
+          </a:prstGeom>
         </p:spPr>
-        <p:txBody>
-          <a:bodyPr>
-            <a:normAutofit/>
-          </a:bodyPr>
-          <a:lstStyle/>
-          <a:p>
-            <a:pPr lvl="1"/>
-            <a:r>
-              <a:rPr lang="en-US" dirty="0" err="1"/>
-              <a:t>Hidden_layer</a:t>
-            </a:r>
-            <a:r>
-              <a:rPr lang="en-US" dirty="0"/>
-              <a:t> math:</a:t>
-            </a:r>
-          </a:p>
-          <a:p>
-            <a:pPr lvl="2"/>
-            <a:r>
-              <a:rPr lang="en-US" dirty="0"/>
-              <a:t>Input: [1, </a:t>
-            </a:r>
-            <a:r>
-              <a:rPr lang="en-US" dirty="0" err="1"/>
-              <a:t>hidden_dim</a:t>
-            </a:r>
-            <a:r>
-              <a:rPr lang="en-US" dirty="0"/>
-              <a:t>]</a:t>
-            </a:r>
-          </a:p>
-          <a:p>
-            <a:pPr lvl="2"/>
-            <a:r>
-              <a:rPr lang="en-US" dirty="0"/>
-              <a:t>Weight: [</a:t>
-            </a:r>
-            <a:r>
-              <a:rPr lang="en-US" dirty="0" err="1"/>
-              <a:t>hidden_dim</a:t>
-            </a:r>
-            <a:r>
-              <a:rPr lang="en-US" dirty="0"/>
-              <a:t>, </a:t>
-            </a:r>
-            <a:r>
-              <a:rPr lang="en-US" dirty="0" err="1"/>
-              <a:t>hidden_dim</a:t>
-            </a:r>
-            <a:r>
-              <a:rPr lang="en-US" dirty="0"/>
-              <a:t>]</a:t>
-            </a:r>
-          </a:p>
-          <a:p>
-            <a:pPr lvl="2"/>
-            <a:r>
-              <a:rPr lang="en-US" dirty="0" err="1"/>
-              <a:t>Matmul</a:t>
-            </a:r>
-            <a:r>
-              <a:rPr lang="en-US" dirty="0"/>
-              <a:t> ( [1, </a:t>
-            </a:r>
-            <a:r>
-              <a:rPr lang="en-US" dirty="0" err="1"/>
-              <a:t>hidden_dim</a:t>
-            </a:r>
-            <a:r>
-              <a:rPr lang="en-US" dirty="0"/>
-              <a:t>], [</a:t>
-            </a:r>
-            <a:r>
-              <a:rPr lang="en-US" dirty="0" err="1"/>
-              <a:t>hidden_dim</a:t>
-            </a:r>
-            <a:r>
-              <a:rPr lang="en-US" dirty="0"/>
-              <a:t>, </a:t>
-            </a:r>
-            <a:r>
-              <a:rPr lang="en-US" dirty="0" err="1"/>
-              <a:t>hidden_dim</a:t>
-            </a:r>
-            <a:r>
-              <a:rPr lang="en-US" dirty="0"/>
-              <a:t>] = [1, </a:t>
-            </a:r>
-            <a:r>
-              <a:rPr lang="en-US" dirty="0" err="1"/>
-              <a:t>hidden_dim</a:t>
-            </a:r>
-            <a:r>
-              <a:rPr lang="en-US" dirty="0"/>
-              <a:t>]</a:t>
-            </a:r>
-          </a:p>
-          <a:p>
-            <a:pPr lvl="2"/>
-            <a:endParaRPr lang="en-US" dirty="0"/>
-          </a:p>
-          <a:p>
-            <a:pPr lvl="1"/>
-            <a:r>
-              <a:rPr lang="en-US" dirty="0"/>
-              <a:t>Output of RNN cell:</a:t>
-            </a:r>
-          </a:p>
-          <a:p>
-            <a:pPr lvl="2"/>
-            <a:r>
-              <a:rPr lang="en-US" dirty="0"/>
-              <a:t>Concatenate </a:t>
-            </a:r>
-            <a:r>
-              <a:rPr lang="en-US" dirty="0" err="1"/>
-              <a:t>hidden_layer</a:t>
-            </a:r>
-            <a:r>
-              <a:rPr lang="en-US" dirty="0"/>
-              <a:t> and </a:t>
-            </a:r>
-            <a:r>
-              <a:rPr lang="en-US" dirty="0" err="1"/>
-              <a:t>input_layer</a:t>
-            </a:r>
-            <a:r>
-              <a:rPr lang="en-US" dirty="0"/>
-              <a:t>:</a:t>
-            </a:r>
-          </a:p>
-          <a:p>
-            <a:pPr lvl="3"/>
-            <a:r>
-              <a:rPr lang="en-US" dirty="0"/>
-              <a:t>[1, </a:t>
-            </a:r>
-            <a:r>
-              <a:rPr lang="en-US" dirty="0" err="1"/>
-              <a:t>hidden_dim</a:t>
-            </a:r>
-            <a:r>
-              <a:rPr lang="en-US" dirty="0"/>
-              <a:t>]. What do we about it?? </a:t>
+      </p:pic>
+      <p:sp>
+        <p:nvSpPr>
+          <p:cNvPr id="6" name="Scroll: Vertical 5">
+            <a:extLst>
+              <a:ext uri="{FF2B5EF4-FFF2-40B4-BE49-F238E27FC236}">
+                <a16:creationId xmlns:a16="http://schemas.microsoft.com/office/drawing/2014/main" id="{DC769E77-45F5-3992-A328-A3A9D62C1A4E}"/>
+              </a:ext>
+            </a:extLst>
+          </p:cNvPr>
+          <p:cNvSpPr/>
+          <p:nvPr/>
+        </p:nvSpPr>
+        <p:spPr>
+          <a:xfrm>
+            <a:off x="314632" y="3726426"/>
+            <a:ext cx="2472936" cy="2766449"/>
+          </a:xfrm>
+          <a:prstGeom prst="verticalScroll">
+            <a:avLst/>
+          </a:prstGeom>
+        </p:spPr>
+        <p:style>
+          <a:lnRef idx="2">
+            <a:schemeClr val="accent1">
+              <a:shade val="15000"/>
+            </a:schemeClr>
+          </a:lnRef>
+          <a:fillRef idx="1">
+            <a:schemeClr val="accent1"/>
+          </a:fillRef>
+          <a:effectRef idx="0">
+            <a:schemeClr val="accent1"/>
+          </a:effectRef>
+          <a:fontRef idx="minor">
+            <a:schemeClr val="lt1"/>
+          </a:fontRef>
+        </p:style>
+        <p:txBody>
+          <a:bodyPr rtlCol="0" anchor="ctr"/>
+          <a:lstStyle/>
+          <a:p>
+            <a:pPr algn="ctr"/>
+            <a:r>
+              <a:rPr lang="en-US" sz="1400" dirty="0"/>
+              <a:t>Would it helpful to map out mind between “rectangle” interpretation and “language model” interpretation of our data</a:t>
             </a:r>
           </a:p>
         </p:txBody>
@@ -4204,7 +5318,7 @@
     </p:spTree>
     <p:extLst>
       <p:ext uri="{BB962C8B-B14F-4D97-AF65-F5344CB8AC3E}">
-        <p14:creationId xmlns:p14="http://schemas.microsoft.com/office/powerpoint/2010/main" val="1950389262"/>
+        <p14:creationId xmlns:p14="http://schemas.microsoft.com/office/powerpoint/2010/main" val="2915899183"/>
       </p:ext>
     </p:extLst>
   </p:cSld>
@@ -4236,7 +5350,7 @@
           <p:cNvPr id="2" name="Title 1">
             <a:extLst>
               <a:ext uri="{FF2B5EF4-FFF2-40B4-BE49-F238E27FC236}">
-                <a16:creationId xmlns:a16="http://schemas.microsoft.com/office/drawing/2014/main" id="{72C13192-81B3-7CAA-F9D7-09478589E1F7}"/>
+                <a16:creationId xmlns:a16="http://schemas.microsoft.com/office/drawing/2014/main" id="{02B2F612-7705-20B4-924B-64FAFF11E56E}"/>
               </a:ext>
             </a:extLst>
           </p:cNvPr>
@@ -4249,69 +5363,396 @@
         </p:nvSpPr>
         <p:spPr/>
         <p:txBody>
-          <a:bodyPr/>
-          <a:lstStyle/>
-          <a:p>
-            <a:r>
-              <a:rPr lang="en-US" dirty="0"/>
-              <a:t>Conclusion</a:t>
-            </a:r>
-          </a:p>
-        </p:txBody>
-      </p:sp>
-      <p:sp>
-        <p:nvSpPr>
-          <p:cNvPr id="3" name="Content Placeholder 2">
-            <a:extLst>
-              <a:ext uri="{FF2B5EF4-FFF2-40B4-BE49-F238E27FC236}">
-                <a16:creationId xmlns:a16="http://schemas.microsoft.com/office/drawing/2014/main" id="{7E64CE4D-FDC0-1A0C-BC15-A4966CC40FD1}"/>
-              </a:ext>
-            </a:extLst>
-          </p:cNvPr>
-          <p:cNvSpPr>
-            <a:spLocks noGrp="1"/>
-          </p:cNvSpPr>
+          <a:bodyPr>
+            <a:normAutofit/>
+          </a:bodyPr>
+          <a:lstStyle/>
+          <a:p>
+            <a:r>
+              <a:rPr lang="en-US" sz="2400" dirty="0"/>
+              <a:t>Side by side comparison 1. basic non-recursive NN 2. LLM/RNN 3.  </a:t>
+            </a:r>
+            <a:r>
+              <a:rPr lang="en-US" sz="2400"/>
+              <a:t>StepbyStep</a:t>
+            </a:r>
+            <a:endParaRPr lang="en-US" sz="2400" dirty="0"/>
+          </a:p>
+        </p:txBody>
+      </p:sp>
+      <p:graphicFrame>
+        <p:nvGraphicFramePr>
+          <p:cNvPr id="7" name="Content Placeholder 6">
+            <a:extLst>
+              <a:ext uri="{FF2B5EF4-FFF2-40B4-BE49-F238E27FC236}">
+                <a16:creationId xmlns:a16="http://schemas.microsoft.com/office/drawing/2014/main" id="{38900F05-FE3A-A958-54E5-9B9399E3BE12}"/>
+              </a:ext>
+            </a:extLst>
+          </p:cNvPr>
+          <p:cNvGraphicFramePr>
+            <a:graphicFrameLocks noGrp="1"/>
+          </p:cNvGraphicFramePr>
           <p:nvPr>
             <p:ph idx="1"/>
-          </p:nvPr>
-        </p:nvSpPr>
-        <p:spPr/>
-        <p:txBody>
-          <a:bodyPr/>
-          <a:lstStyle/>
-          <a:p>
-            <a:r>
-              <a:rPr lang="en-US" dirty="0"/>
-              <a:t>We fed just a single sample [1,4,2] which is a single rectangle to RNN cell.</a:t>
-            </a:r>
-          </a:p>
-          <a:p>
-            <a:r>
-              <a:rPr lang="en-US" dirty="0"/>
-              <a:t>But wait, we only fed 1</a:t>
-            </a:r>
-            <a:r>
-              <a:rPr lang="en-US" baseline="30000" dirty="0"/>
-              <a:t>st</a:t>
-            </a:r>
-            <a:r>
-              <a:rPr lang="en-US" dirty="0"/>
-              <a:t> corner: </a:t>
-            </a:r>
-          </a:p>
-          <a:p>
-            <a:pPr lvl="1"/>
-            <a:r>
-              <a:rPr lang="en-US" dirty="0"/>
-              <a:t>therefore [1,4,2] =&gt; [4,2] =&gt; [:1, 2] =&gt; [1,2]. </a:t>
-            </a:r>
-          </a:p>
-        </p:txBody>
-      </p:sp>
+            <p:extLst>
+              <p:ext uri="{D42A27DB-BD31-4B8C-83A1-F6EECF244321}">
+                <p14:modId xmlns:p14="http://schemas.microsoft.com/office/powerpoint/2010/main" val="1647409555"/>
+              </p:ext>
+            </p:extLst>
+          </p:nvPr>
+        </p:nvGraphicFramePr>
+        <p:xfrm>
+          <a:off x="838200" y="1825625"/>
+          <a:ext cx="10515598" cy="2667000"/>
+        </p:xfrm>
+        <a:graphic>
+          <a:graphicData uri="http://schemas.openxmlformats.org/drawingml/2006/table">
+            <a:tbl>
+              <a:tblPr firstRow="1" bandRow="1">
+                <a:tableStyleId>{5C22544A-7EE6-4342-B048-85BDC9FD1C3A}</a:tableStyleId>
+              </a:tblPr>
+              <a:tblGrid>
+                <a:gridCol w="2032819">
+                  <a:extLst>
+                    <a:ext uri="{9D8B030D-6E8A-4147-A177-3AD203B41FA5}">
+                      <a16:colId xmlns:a16="http://schemas.microsoft.com/office/drawing/2014/main" val="2603612626"/>
+                    </a:ext>
+                  </a:extLst>
+                </a:gridCol>
+                <a:gridCol w="2379407">
+                  <a:extLst>
+                    <a:ext uri="{9D8B030D-6E8A-4147-A177-3AD203B41FA5}">
+                      <a16:colId xmlns:a16="http://schemas.microsoft.com/office/drawing/2014/main" val="508427940"/>
+                    </a:ext>
+                  </a:extLst>
+                </a:gridCol>
+                <a:gridCol w="2598173">
+                  <a:extLst>
+                    <a:ext uri="{9D8B030D-6E8A-4147-A177-3AD203B41FA5}">
+                      <a16:colId xmlns:a16="http://schemas.microsoft.com/office/drawing/2014/main" val="2952482917"/>
+                    </a:ext>
+                  </a:extLst>
+                </a:gridCol>
+                <a:gridCol w="3505199">
+                  <a:extLst>
+                    <a:ext uri="{9D8B030D-6E8A-4147-A177-3AD203B41FA5}">
+                      <a16:colId xmlns:a16="http://schemas.microsoft.com/office/drawing/2014/main" val="1307529531"/>
+                    </a:ext>
+                  </a:extLst>
+                </a:gridCol>
+              </a:tblGrid>
+              <a:tr h="370840">
+                <a:tc>
+                  <a:txBody>
+                    <a:bodyPr/>
+                    <a:lstStyle/>
+                    <a:p>
+                      <a:r>
+                        <a:rPr lang="en-US" dirty="0"/>
+                        <a:t>Model</a:t>
+                      </a:r>
+                    </a:p>
+                  </a:txBody>
+                  <a:tcPr/>
+                </a:tc>
+                <a:tc>
+                  <a:txBody>
+                    <a:bodyPr/>
+                    <a:lstStyle/>
+                    <a:p>
+                      <a:r>
+                        <a:rPr lang="en-US" dirty="0"/>
+                        <a:t>Basic Neural network (</a:t>
+                      </a:r>
+                      <a:r>
+                        <a:rPr lang="en-US" dirty="0" err="1"/>
+                        <a:t>I.e.linear</a:t>
+                      </a:r>
+                      <a:r>
+                        <a:rPr lang="en-US" dirty="0"/>
+                        <a:t>, non-recursive) </a:t>
+                      </a:r>
+                    </a:p>
+                  </a:txBody>
+                  <a:tcPr/>
+                </a:tc>
+                <a:tc>
+                  <a:txBody>
+                    <a:bodyPr/>
+                    <a:lstStyle/>
+                    <a:p>
+                      <a:r>
+                        <a:rPr lang="en-US" dirty="0"/>
+                        <a:t>LLM (large language model)</a:t>
+                      </a:r>
+                    </a:p>
+                  </a:txBody>
+                  <a:tcPr/>
+                </a:tc>
+                <a:tc>
+                  <a:txBody>
+                    <a:bodyPr/>
+                    <a:lstStyle/>
+                    <a:p>
+                      <a:r>
+                        <a:rPr lang="en-US" dirty="0" err="1"/>
+                        <a:t>StepByStep</a:t>
+                      </a:r>
+                      <a:endParaRPr lang="en-US" dirty="0"/>
+                    </a:p>
+                  </a:txBody>
+                  <a:tcPr/>
+                </a:tc>
+                <a:extLst>
+                  <a:ext uri="{0D108BD9-81ED-4DB2-BD59-A6C34878D82A}">
+                    <a16:rowId xmlns:a16="http://schemas.microsoft.com/office/drawing/2014/main" val="1730892831"/>
+                  </a:ext>
+                </a:extLst>
+              </a:tr>
+              <a:tr h="370840">
+                <a:tc>
+                  <a:txBody>
+                    <a:bodyPr/>
+                    <a:lstStyle/>
+                    <a:p>
+                      <a:r>
+                        <a:rPr lang="en-US" dirty="0"/>
+                        <a:t>Samples</a:t>
+                      </a:r>
+                    </a:p>
+                  </a:txBody>
+                  <a:tcPr/>
+                </a:tc>
+                <a:tc>
+                  <a:txBody>
+                    <a:bodyPr/>
+                    <a:lstStyle/>
+                    <a:p>
+                      <a:r>
+                        <a:rPr lang="en-US" dirty="0"/>
+                        <a:t>Housing data entries</a:t>
+                      </a:r>
+                    </a:p>
+                  </a:txBody>
+                  <a:tcPr/>
+                </a:tc>
+                <a:tc>
+                  <a:txBody>
+                    <a:bodyPr/>
+                    <a:lstStyle/>
+                    <a:p>
+                      <a:r>
+                        <a:rPr lang="en-US" dirty="0"/>
+                        <a:t>~Sentences</a:t>
+                      </a:r>
+                    </a:p>
+                  </a:txBody>
+                  <a:tcPr/>
+                </a:tc>
+                <a:tc>
+                  <a:txBody>
+                    <a:bodyPr/>
+                    <a:lstStyle/>
+                    <a:p>
+                      <a:r>
+                        <a:rPr lang="en-US" dirty="0"/>
+                        <a:t>Rectangles</a:t>
+                      </a:r>
+                    </a:p>
+                  </a:txBody>
+                  <a:tcPr/>
+                </a:tc>
+                <a:extLst>
+                  <a:ext uri="{0D108BD9-81ED-4DB2-BD59-A6C34878D82A}">
+                    <a16:rowId xmlns:a16="http://schemas.microsoft.com/office/drawing/2014/main" val="1013352280"/>
+                  </a:ext>
+                </a:extLst>
+              </a:tr>
+              <a:tr h="370840">
+                <a:tc>
+                  <a:txBody>
+                    <a:bodyPr/>
+                    <a:lstStyle/>
+                    <a:p>
+                      <a:r>
+                        <a:rPr lang="en-US" dirty="0"/>
+                        <a:t>Sequences</a:t>
+                      </a:r>
+                    </a:p>
+                  </a:txBody>
+                  <a:tcPr/>
+                </a:tc>
+                <a:tc>
+                  <a:txBody>
+                    <a:bodyPr/>
+                    <a:lstStyle/>
+                    <a:p>
+                      <a:r>
+                        <a:rPr lang="en-US" dirty="0"/>
+                        <a:t>N/A</a:t>
+                      </a:r>
+                    </a:p>
+                  </a:txBody>
+                  <a:tcPr/>
+                </a:tc>
+                <a:tc>
+                  <a:txBody>
+                    <a:bodyPr/>
+                    <a:lstStyle/>
+                    <a:p>
+                      <a:r>
+                        <a:rPr lang="en-US" dirty="0"/>
+                        <a:t>Words in a sentences</a:t>
+                      </a:r>
+                    </a:p>
+                  </a:txBody>
+                  <a:tcPr/>
+                </a:tc>
+                <a:tc>
+                  <a:txBody>
+                    <a:bodyPr/>
+                    <a:lstStyle/>
+                    <a:p>
+                      <a:r>
+                        <a:rPr lang="en-US" dirty="0"/>
+                        <a:t>4 corners of rectangle</a:t>
+                      </a:r>
+                    </a:p>
+                  </a:txBody>
+                  <a:tcPr/>
+                </a:tc>
+                <a:extLst>
+                  <a:ext uri="{0D108BD9-81ED-4DB2-BD59-A6C34878D82A}">
+                    <a16:rowId xmlns:a16="http://schemas.microsoft.com/office/drawing/2014/main" val="4255003966"/>
+                  </a:ext>
+                </a:extLst>
+              </a:tr>
+              <a:tr h="370840">
+                <a:tc>
+                  <a:txBody>
+                    <a:bodyPr/>
+                    <a:lstStyle/>
+                    <a:p>
+                      <a:r>
+                        <a:rPr lang="en-US" dirty="0"/>
+                        <a:t>Features</a:t>
+                      </a:r>
+                    </a:p>
+                  </a:txBody>
+                  <a:tcPr/>
+                </a:tc>
+                <a:tc>
+                  <a:txBody>
+                    <a:bodyPr/>
+                    <a:lstStyle/>
+                    <a:p>
+                      <a:r>
+                        <a:rPr lang="en-US" dirty="0"/>
+                        <a:t>Location, features</a:t>
+                      </a:r>
+                    </a:p>
+                  </a:txBody>
+                  <a:tcPr/>
+                </a:tc>
+                <a:tc>
+                  <a:txBody>
+                    <a:bodyPr/>
+                    <a:lstStyle/>
+                    <a:p>
+                      <a:r>
+                        <a:rPr lang="en-US" dirty="0"/>
+                        <a:t>Single word meaning/encoding</a:t>
+                      </a:r>
+                    </a:p>
+                  </a:txBody>
+                  <a:tcPr/>
+                </a:tc>
+                <a:tc>
+                  <a:txBody>
+                    <a:bodyPr/>
+                    <a:lstStyle/>
+                    <a:p>
+                      <a:r>
+                        <a:rPr lang="en-US" dirty="0"/>
+                        <a:t>Coordinates of rectangle</a:t>
+                      </a:r>
+                    </a:p>
+                  </a:txBody>
+                  <a:tcPr/>
+                </a:tc>
+                <a:extLst>
+                  <a:ext uri="{0D108BD9-81ED-4DB2-BD59-A6C34878D82A}">
+                    <a16:rowId xmlns:a16="http://schemas.microsoft.com/office/drawing/2014/main" val="1706035337"/>
+                  </a:ext>
+                </a:extLst>
+              </a:tr>
+              <a:tr h="370840">
+                <a:tc>
+                  <a:txBody>
+                    <a:bodyPr/>
+                    <a:lstStyle/>
+                    <a:p>
+                      <a:r>
+                        <a:rPr lang="en-US" dirty="0"/>
+                        <a:t>Label</a:t>
+                      </a:r>
+                    </a:p>
+                  </a:txBody>
+                  <a:tcPr/>
+                </a:tc>
+                <a:tc>
+                  <a:txBody>
+                    <a:bodyPr/>
+                    <a:lstStyle/>
+                    <a:p>
+                      <a:r>
+                        <a:rPr lang="en-US" dirty="0"/>
+                        <a:t>Price</a:t>
+                      </a:r>
+                    </a:p>
+                  </a:txBody>
+                  <a:tcPr/>
+                </a:tc>
+                <a:tc>
+                  <a:txBody>
+                    <a:bodyPr/>
+                    <a:lstStyle/>
+                    <a:p>
+                      <a:r>
+                        <a:rPr lang="en-US" dirty="0"/>
+                        <a:t>Next word</a:t>
+                      </a:r>
+                    </a:p>
+                  </a:txBody>
+                  <a:tcPr/>
+                </a:tc>
+                <a:tc>
+                  <a:txBody>
+                    <a:bodyPr/>
+                    <a:lstStyle/>
+                    <a:p>
+                      <a:r>
+                        <a:rPr lang="en-US" dirty="0"/>
+                        <a:t>Coord. Of next corner of rectangle</a:t>
+                      </a:r>
+                    </a:p>
+                  </a:txBody>
+                  <a:tcPr/>
+                </a:tc>
+                <a:extLst>
+                  <a:ext uri="{0D108BD9-81ED-4DB2-BD59-A6C34878D82A}">
+                    <a16:rowId xmlns:a16="http://schemas.microsoft.com/office/drawing/2014/main" val="1283449758"/>
+                  </a:ext>
+                </a:extLst>
+              </a:tr>
+            </a:tbl>
+          </a:graphicData>
+        </a:graphic>
+      </p:graphicFrame>
     </p:spTree>
     <p:extLst>
       <p:ext uri="{BB962C8B-B14F-4D97-AF65-F5344CB8AC3E}">
-        <p14:creationId xmlns:p14="http://schemas.microsoft.com/office/powerpoint/2010/main" val="2660101701"/>
+        <p14:creationId xmlns:p14="http://schemas.microsoft.com/office/powerpoint/2010/main" val="988025460"/>
       </p:ext>
     </p:extLst>
   </p:cSld>
@@ -4338,159 +5779,587 @@
           <a:chExt cx="0" cy="0"/>
         </a:xfrm>
       </p:grpSpPr>
-      <p:sp>
-        <p:nvSpPr>
-          <p:cNvPr id="2" name="Title 1">
-            <a:extLst>
-              <a:ext uri="{FF2B5EF4-FFF2-40B4-BE49-F238E27FC236}">
-                <a16:creationId xmlns:a16="http://schemas.microsoft.com/office/drawing/2014/main" id="{6DF26A5A-11E1-AFAD-553D-85E5D5E28BE3}"/>
-              </a:ext>
-            </a:extLst>
-          </p:cNvPr>
-          <p:cNvSpPr>
-            <a:spLocks noGrp="1"/>
-          </p:cNvSpPr>
-          <p:nvPr>
-            <p:ph type="title"/>
-          </p:nvPr>
-        </p:nvSpPr>
-        <p:spPr/>
-        <p:txBody>
-          <a:bodyPr/>
-          <a:lstStyle/>
-          <a:p>
-            <a:r>
-              <a:rPr lang="en-US" dirty="0"/>
-              <a:t>Now we feed full sequence</a:t>
-            </a:r>
-          </a:p>
-        </p:txBody>
-      </p:sp>
-      <p:sp>
-        <p:nvSpPr>
-          <p:cNvPr id="3" name="Content Placeholder 2">
-            <a:extLst>
-              <a:ext uri="{FF2B5EF4-FFF2-40B4-BE49-F238E27FC236}">
-                <a16:creationId xmlns:a16="http://schemas.microsoft.com/office/drawing/2014/main" id="{93A369D2-2DD8-4F15-2CA7-96E93C4E6207}"/>
-              </a:ext>
-            </a:extLst>
-          </p:cNvPr>
-          <p:cNvSpPr>
-            <a:spLocks noGrp="1"/>
-          </p:cNvSpPr>
-          <p:nvPr>
-            <p:ph idx="1"/>
-          </p:nvPr>
-        </p:nvSpPr>
-        <p:spPr/>
-        <p:txBody>
-          <a:bodyPr/>
-          <a:lstStyle/>
-          <a:p>
-            <a:r>
-              <a:rPr lang="en-US" dirty="0"/>
-              <a:t>Full sequence: X=[1,4,2]=[4,2]</a:t>
-            </a:r>
-          </a:p>
-          <a:p>
-            <a:r>
-              <a:rPr lang="en-US" dirty="0"/>
-              <a:t>But we don’t do </a:t>
-            </a:r>
-            <a:r>
-              <a:rPr lang="en-US" dirty="0" err="1"/>
-              <a:t>rnn</a:t>
-            </a:r>
-            <a:r>
-              <a:rPr lang="en-US" dirty="0"/>
-              <a:t>(X)</a:t>
-            </a:r>
-          </a:p>
-          <a:p>
-            <a:r>
-              <a:rPr lang="en-US" dirty="0"/>
-              <a:t>Instead:</a:t>
-            </a:r>
-          </a:p>
-          <a:p>
-            <a:pPr lvl="1"/>
-            <a:r>
-              <a:rPr lang="en-US" dirty="0"/>
-              <a:t>For </a:t>
-            </a:r>
-            <a:r>
-              <a:rPr lang="en-US" dirty="0" err="1"/>
-              <a:t>i</a:t>
-            </a:r>
-            <a:r>
-              <a:rPr lang="en-US" dirty="0"/>
-              <a:t> in range (</a:t>
-            </a:r>
-            <a:r>
-              <a:rPr lang="en-US" dirty="0" err="1"/>
-              <a:t>X.shape</a:t>
-            </a:r>
-            <a:r>
-              <a:rPr lang="en-US" dirty="0"/>
-              <a:t>[0]=4): # iterating over first dim of X which is 4.</a:t>
-            </a:r>
-          </a:p>
-          <a:p>
-            <a:pPr lvl="2"/>
-            <a:r>
-              <a:rPr lang="en-US" dirty="0" err="1"/>
-              <a:t>rnn_cell</a:t>
-            </a:r>
-            <a:r>
-              <a:rPr lang="en-US" dirty="0"/>
-              <a:t>( X[</a:t>
-            </a:r>
-            <a:r>
-              <a:rPr lang="en-US" dirty="0" err="1"/>
-              <a:t>i</a:t>
-            </a:r>
-            <a:r>
-              <a:rPr lang="en-US" dirty="0"/>
-              <a:t>] )</a:t>
-            </a:r>
-          </a:p>
-          <a:p>
-            <a:r>
-              <a:rPr lang="en-US" dirty="0"/>
-              <a:t>But this is one at a time.</a:t>
-            </a:r>
-          </a:p>
-          <a:p>
-            <a:r>
-              <a:rPr lang="en-US" dirty="0"/>
-              <a:t>Review back: input:</a:t>
-            </a:r>
-          </a:p>
-          <a:p>
-            <a:pPr lvl="1"/>
-            <a:r>
-              <a:rPr lang="en-US" dirty="0"/>
-              <a:t>254, 4, 2=[samples, corners (sequence), coord (features)</a:t>
-            </a:r>
-          </a:p>
-          <a:p>
-            <a:pPr lvl="1"/>
-            <a:r>
-              <a:rPr lang="en-US" dirty="0"/>
-              <a:t>254, 4, 2=[4-word sentences, words in a sentence, </a:t>
-            </a:r>
-            <a:r>
-              <a:rPr lang="en-US"/>
-              <a:t>word meaning)</a:t>
-            </a:r>
-            <a:endParaRPr lang="en-US" dirty="0"/>
-          </a:p>
-        </p:txBody>
-      </p:sp>
+      <p:pic>
+        <p:nvPicPr>
+          <p:cNvPr id="7" name="Picture 6">
+            <a:extLst>
+              <a:ext uri="{FF2B5EF4-FFF2-40B4-BE49-F238E27FC236}">
+                <a16:creationId xmlns:a16="http://schemas.microsoft.com/office/drawing/2014/main" id="{05EFC075-8E53-9741-E853-A659942E2916}"/>
+              </a:ext>
+            </a:extLst>
+          </p:cNvPr>
+          <p:cNvPicPr>
+            <a:picLocks noChangeAspect="1"/>
+          </p:cNvPicPr>
+          <p:nvPr/>
+        </p:nvPicPr>
+        <p:blipFill>
+          <a:blip r:embed="rId2"/>
+          <a:stretch>
+            <a:fillRect/>
+          </a:stretch>
+        </p:blipFill>
+        <p:spPr>
+          <a:xfrm>
+            <a:off x="2038350" y="72390"/>
+            <a:ext cx="8115300" cy="6713220"/>
+          </a:xfrm>
+          <a:prstGeom prst="rect">
+            <a:avLst/>
+          </a:prstGeom>
+        </p:spPr>
+      </p:pic>
     </p:spTree>
     <p:extLst>
       <p:ext uri="{BB962C8B-B14F-4D97-AF65-F5344CB8AC3E}">
-        <p14:creationId xmlns:p14="http://schemas.microsoft.com/office/powerpoint/2010/main" val="2270288965"/>
+        <p14:creationId xmlns:p14="http://schemas.microsoft.com/office/powerpoint/2010/main" val="2182253009"/>
+      </p:ext>
+    </p:extLst>
+  </p:cSld>
+  <p:clrMapOvr>
+    <a:masterClrMapping/>
+  </p:clrMapOvr>
+</p:sld>
+</file>
+
+<file path=ppt/slides/slide8.xml><?xml version="1.0" encoding="utf-8"?>
+<p:sld xmlns:a="http://schemas.openxmlformats.org/drawingml/2006/main" xmlns:r="http://schemas.openxmlformats.org/officeDocument/2006/relationships" xmlns:p="http://schemas.openxmlformats.org/presentationml/2006/main">
+  <p:cSld>
+    <p:spTree>
+      <p:nvGrpSpPr>
+        <p:cNvPr id="1" name=""/>
+        <p:cNvGrpSpPr/>
+        <p:nvPr/>
+      </p:nvGrpSpPr>
+      <p:grpSpPr>
+        <a:xfrm>
+          <a:off x="0" y="0"/>
+          <a:ext cx="0" cy="0"/>
+          <a:chOff x="0" y="0"/>
+          <a:chExt cx="0" cy="0"/>
+        </a:xfrm>
+      </p:grpSpPr>
+      <p:sp>
+        <p:nvSpPr>
+          <p:cNvPr id="2" name="Title 1">
+            <a:extLst>
+              <a:ext uri="{FF2B5EF4-FFF2-40B4-BE49-F238E27FC236}">
+                <a16:creationId xmlns:a16="http://schemas.microsoft.com/office/drawing/2014/main" id="{F4B83C86-8760-6589-B1ED-0259C477A4F5}"/>
+              </a:ext>
+            </a:extLst>
+          </p:cNvPr>
+          <p:cNvSpPr>
+            <a:spLocks noGrp="1"/>
+          </p:cNvSpPr>
+          <p:nvPr>
+            <p:ph type="title"/>
+          </p:nvPr>
+        </p:nvSpPr>
+        <p:spPr/>
+        <p:txBody>
+          <a:bodyPr/>
+          <a:lstStyle/>
+          <a:p>
+            <a:r>
+              <a:rPr lang="en-US" dirty="0"/>
+              <a:t>RNN cell	</a:t>
+            </a:r>
+          </a:p>
+        </p:txBody>
+      </p:sp>
+      <p:sp>
+        <p:nvSpPr>
+          <p:cNvPr id="3" name="Content Placeholder 2">
+            <a:extLst>
+              <a:ext uri="{FF2B5EF4-FFF2-40B4-BE49-F238E27FC236}">
+                <a16:creationId xmlns:a16="http://schemas.microsoft.com/office/drawing/2014/main" id="{1F3D5939-8CC4-0ADA-04B5-207D7BD5EFF6}"/>
+              </a:ext>
+            </a:extLst>
+          </p:cNvPr>
+          <p:cNvSpPr>
+            <a:spLocks noGrp="1"/>
+          </p:cNvSpPr>
+          <p:nvPr>
+            <p:ph idx="1"/>
+          </p:nvPr>
+        </p:nvSpPr>
+        <p:spPr>
+          <a:xfrm>
+            <a:off x="838200" y="1825625"/>
+            <a:ext cx="10515600" cy="4667250"/>
+          </a:xfrm>
+        </p:spPr>
+        <p:txBody>
+          <a:bodyPr>
+            <a:normAutofit/>
+          </a:bodyPr>
+          <a:lstStyle/>
+          <a:p>
+            <a:r>
+              <a:rPr lang="en-US" dirty="0"/>
+              <a:t>Containing 2 linear layers:</a:t>
+            </a:r>
+          </a:p>
+          <a:p>
+            <a:pPr lvl="1"/>
+            <a:r>
+              <a:rPr lang="en-US" dirty="0" err="1"/>
+              <a:t>Input_layer</a:t>
+            </a:r>
+            <a:r>
+              <a:rPr lang="en-US" dirty="0"/>
+              <a:t>: in: [1,input_size=</a:t>
+            </a:r>
+            <a:r>
+              <a:rPr lang="en-US" dirty="0" err="1"/>
+              <a:t>n_features</a:t>
+            </a:r>
+            <a:r>
+              <a:rPr lang="en-US" dirty="0"/>
+              <a:t>], out: [1, </a:t>
+            </a:r>
+            <a:r>
+              <a:rPr lang="en-US" dirty="0" err="1"/>
+              <a:t>hidden_dim</a:t>
+            </a:r>
+            <a:r>
+              <a:rPr lang="en-US" dirty="0"/>
+              <a:t>=</a:t>
+            </a:r>
+            <a:r>
+              <a:rPr lang="en-US" dirty="0" err="1"/>
+              <a:t>hidden_size</a:t>
+            </a:r>
+            <a:r>
+              <a:rPr lang="en-US" dirty="0"/>
+              <a:t>]</a:t>
+            </a:r>
+          </a:p>
+          <a:p>
+            <a:pPr lvl="1"/>
+            <a:r>
+              <a:rPr lang="en-US" dirty="0" err="1"/>
+              <a:t>Hidden_layer</a:t>
+            </a:r>
+            <a:r>
+              <a:rPr lang="en-US" dirty="0"/>
+              <a:t>: in: [1, </a:t>
+            </a:r>
+            <a:r>
+              <a:rPr lang="en-US" dirty="0" err="1"/>
+              <a:t>hidden_dim</a:t>
+            </a:r>
+            <a:r>
+              <a:rPr lang="en-US" dirty="0"/>
+              <a:t>], out: [1, </a:t>
+            </a:r>
+            <a:r>
+              <a:rPr lang="en-US" dirty="0" err="1"/>
+              <a:t>hidden_dim</a:t>
+            </a:r>
+            <a:r>
+              <a:rPr lang="en-US" dirty="0"/>
+              <a:t>].</a:t>
+            </a:r>
+          </a:p>
+          <a:p>
+            <a:pPr lvl="1"/>
+            <a:r>
+              <a:rPr lang="en-US" dirty="0"/>
+              <a:t>Weights [</a:t>
+            </a:r>
+            <a:r>
+              <a:rPr lang="en-US" dirty="0" err="1"/>
+              <a:t>hidden_size</a:t>
+            </a:r>
+            <a:r>
+              <a:rPr lang="en-US" dirty="0"/>
+              <a:t>, </a:t>
+            </a:r>
+            <a:r>
+              <a:rPr lang="en-US" dirty="0" err="1"/>
+              <a:t>input_size</a:t>
+            </a:r>
+            <a:r>
+              <a:rPr lang="en-US" dirty="0"/>
+              <a:t>]</a:t>
+            </a:r>
+          </a:p>
+          <a:p>
+            <a:pPr lvl="1"/>
+            <a:r>
+              <a:rPr lang="en-US" dirty="0"/>
+              <a:t>What happens in forward() [aka: predict, inference]:</a:t>
+            </a:r>
+          </a:p>
+          <a:p>
+            <a:pPr lvl="2"/>
+            <a:r>
+              <a:rPr lang="en-US" dirty="0" err="1"/>
+              <a:t>Matmul</a:t>
+            </a:r>
+            <a:r>
+              <a:rPr lang="en-US" dirty="0"/>
+              <a:t> (&lt;input&gt;, &lt;weights&gt;] </a:t>
+            </a:r>
+          </a:p>
+          <a:p>
+            <a:pPr lvl="1"/>
+            <a:r>
+              <a:rPr lang="en-US" dirty="0"/>
+              <a:t>How about dimensions?</a:t>
+            </a:r>
+          </a:p>
+          <a:p>
+            <a:pPr lvl="2"/>
+            <a:r>
+              <a:rPr lang="en-US" dirty="0" err="1"/>
+              <a:t>Matmul</a:t>
+            </a:r>
+            <a:r>
+              <a:rPr lang="en-US" dirty="0"/>
+              <a:t>( [1, </a:t>
+            </a:r>
+            <a:r>
+              <a:rPr lang="en-US" dirty="0" err="1"/>
+              <a:t>input_size</a:t>
+            </a:r>
+            <a:r>
+              <a:rPr lang="en-US" dirty="0"/>
+              <a:t>][</a:t>
+            </a:r>
+            <a:r>
+              <a:rPr lang="en-US" dirty="0" err="1"/>
+              <a:t>hidden_size</a:t>
+            </a:r>
+            <a:r>
+              <a:rPr lang="en-US" dirty="0"/>
+              <a:t>, </a:t>
+            </a:r>
+            <a:r>
+              <a:rPr lang="en-US" dirty="0" err="1"/>
+              <a:t>input_size</a:t>
+            </a:r>
+            <a:r>
+              <a:rPr lang="en-US" dirty="0"/>
+              <a:t>] ??? But isn’t :</a:t>
+            </a:r>
+          </a:p>
+          <a:p>
+            <a:pPr lvl="2"/>
+            <a:r>
+              <a:rPr lang="en-US" dirty="0" err="1"/>
+              <a:t>Matmul</a:t>
+            </a:r>
+            <a:r>
+              <a:rPr lang="en-US" dirty="0"/>
+              <a:t> ( [N,M], [M,K] ) =&gt; [N,K].</a:t>
+            </a:r>
+          </a:p>
+          <a:p>
+            <a:pPr lvl="2"/>
+            <a:r>
+              <a:rPr lang="en-US" dirty="0"/>
+              <a:t>Answer (weight is transposed):</a:t>
+            </a:r>
+          </a:p>
+          <a:p>
+            <a:pPr lvl="2"/>
+            <a:r>
+              <a:rPr lang="en-US" dirty="0" err="1"/>
+              <a:t>Matmul</a:t>
+            </a:r>
+            <a:r>
+              <a:rPr lang="en-US" dirty="0"/>
+              <a:t>( [1, </a:t>
+            </a:r>
+            <a:r>
+              <a:rPr lang="en-US" dirty="0" err="1"/>
+              <a:t>input_size</a:t>
+            </a:r>
+            <a:r>
+              <a:rPr lang="en-US" dirty="0"/>
+              <a:t>][</a:t>
+            </a:r>
+            <a:r>
+              <a:rPr lang="en-US" dirty="0" err="1"/>
+              <a:t>input_size</a:t>
+            </a:r>
+            <a:r>
+              <a:rPr lang="en-US" dirty="0"/>
+              <a:t>, </a:t>
+            </a:r>
+            <a:r>
+              <a:rPr lang="en-US" dirty="0" err="1"/>
+              <a:t>hidden_size</a:t>
+            </a:r>
+            <a:r>
+              <a:rPr lang="en-US" dirty="0"/>
+              <a:t>] =&gt; [1, </a:t>
+            </a:r>
+            <a:r>
+              <a:rPr lang="en-US" dirty="0" err="1"/>
+              <a:t>hidden_size</a:t>
+            </a:r>
+            <a:r>
+              <a:rPr lang="en-US" dirty="0"/>
+              <a:t>] (output and also feedback to </a:t>
+            </a:r>
+            <a:r>
+              <a:rPr lang="en-US" dirty="0" err="1"/>
+              <a:t>hidden_layer</a:t>
+            </a:r>
+            <a:r>
+              <a:rPr lang="en-US" dirty="0"/>
+              <a:t>)</a:t>
+            </a:r>
+          </a:p>
+          <a:p>
+            <a:pPr lvl="2"/>
+            <a:endParaRPr lang="en-US" dirty="0"/>
+          </a:p>
+          <a:p>
+            <a:pPr lvl="2"/>
+            <a:endParaRPr lang="en-US" dirty="0"/>
+          </a:p>
+          <a:p>
+            <a:pPr lvl="1"/>
+            <a:endParaRPr lang="en-US" dirty="0"/>
+          </a:p>
+        </p:txBody>
+      </p:sp>
+    </p:spTree>
+    <p:extLst>
+      <p:ext uri="{BB962C8B-B14F-4D97-AF65-F5344CB8AC3E}">
+        <p14:creationId xmlns:p14="http://schemas.microsoft.com/office/powerpoint/2010/main" val="3287707793"/>
+      </p:ext>
+    </p:extLst>
+  </p:cSld>
+  <p:clrMapOvr>
+    <a:masterClrMapping/>
+  </p:clrMapOvr>
+</p:sld>
+</file>
+
+<file path=ppt/slides/slide9.xml><?xml version="1.0" encoding="utf-8"?>
+<p:sld xmlns:a="http://schemas.openxmlformats.org/drawingml/2006/main" xmlns:r="http://schemas.openxmlformats.org/officeDocument/2006/relationships" xmlns:p="http://schemas.openxmlformats.org/presentationml/2006/main">
+  <p:cSld>
+    <p:spTree>
+      <p:nvGrpSpPr>
+        <p:cNvPr id="1" name=""/>
+        <p:cNvGrpSpPr/>
+        <p:nvPr/>
+      </p:nvGrpSpPr>
+      <p:grpSpPr>
+        <a:xfrm>
+          <a:off x="0" y="0"/>
+          <a:ext cx="0" cy="0"/>
+          <a:chOff x="0" y="0"/>
+          <a:chExt cx="0" cy="0"/>
+        </a:xfrm>
+      </p:grpSpPr>
+      <p:sp>
+        <p:nvSpPr>
+          <p:cNvPr id="2" name="Title 1">
+            <a:extLst>
+              <a:ext uri="{FF2B5EF4-FFF2-40B4-BE49-F238E27FC236}">
+                <a16:creationId xmlns:a16="http://schemas.microsoft.com/office/drawing/2014/main" id="{F4B83C86-8760-6589-B1ED-0259C477A4F5}"/>
+              </a:ext>
+            </a:extLst>
+          </p:cNvPr>
+          <p:cNvSpPr>
+            <a:spLocks noGrp="1"/>
+          </p:cNvSpPr>
+          <p:nvPr>
+            <p:ph type="title"/>
+          </p:nvPr>
+        </p:nvSpPr>
+        <p:spPr/>
+        <p:txBody>
+          <a:bodyPr/>
+          <a:lstStyle/>
+          <a:p>
+            <a:r>
+              <a:rPr lang="en-US" dirty="0"/>
+              <a:t>RNN cell	</a:t>
+            </a:r>
+          </a:p>
+        </p:txBody>
+      </p:sp>
+      <p:sp>
+        <p:nvSpPr>
+          <p:cNvPr id="3" name="Content Placeholder 2">
+            <a:extLst>
+              <a:ext uri="{FF2B5EF4-FFF2-40B4-BE49-F238E27FC236}">
+                <a16:creationId xmlns:a16="http://schemas.microsoft.com/office/drawing/2014/main" id="{1F3D5939-8CC4-0ADA-04B5-207D7BD5EFF6}"/>
+              </a:ext>
+            </a:extLst>
+          </p:cNvPr>
+          <p:cNvSpPr>
+            <a:spLocks noGrp="1"/>
+          </p:cNvSpPr>
+          <p:nvPr>
+            <p:ph idx="1"/>
+          </p:nvPr>
+        </p:nvSpPr>
+        <p:spPr>
+          <a:xfrm>
+            <a:off x="838200" y="1825625"/>
+            <a:ext cx="10515600" cy="4667250"/>
+          </a:xfrm>
+        </p:spPr>
+        <p:txBody>
+          <a:bodyPr>
+            <a:normAutofit/>
+          </a:bodyPr>
+          <a:lstStyle/>
+          <a:p>
+            <a:pPr lvl="1"/>
+            <a:r>
+              <a:rPr lang="en-US" dirty="0" err="1"/>
+              <a:t>Hidden_layer</a:t>
+            </a:r>
+            <a:r>
+              <a:rPr lang="en-US" dirty="0"/>
+              <a:t> math:</a:t>
+            </a:r>
+          </a:p>
+          <a:p>
+            <a:pPr lvl="2"/>
+            <a:r>
+              <a:rPr lang="en-US" dirty="0"/>
+              <a:t>Input: [1, </a:t>
+            </a:r>
+            <a:r>
+              <a:rPr lang="en-US" dirty="0" err="1"/>
+              <a:t>hidden_dim</a:t>
+            </a:r>
+            <a:r>
+              <a:rPr lang="en-US" dirty="0"/>
+              <a:t>]</a:t>
+            </a:r>
+          </a:p>
+          <a:p>
+            <a:pPr lvl="2"/>
+            <a:r>
+              <a:rPr lang="en-US" dirty="0"/>
+              <a:t>Weight: [</a:t>
+            </a:r>
+            <a:r>
+              <a:rPr lang="en-US" dirty="0" err="1"/>
+              <a:t>hidden_dim</a:t>
+            </a:r>
+            <a:r>
+              <a:rPr lang="en-US" dirty="0"/>
+              <a:t>, </a:t>
+            </a:r>
+            <a:r>
+              <a:rPr lang="en-US" dirty="0" err="1"/>
+              <a:t>hidden_dim</a:t>
+            </a:r>
+            <a:r>
+              <a:rPr lang="en-US" dirty="0"/>
+              <a:t>]</a:t>
+            </a:r>
+          </a:p>
+          <a:p>
+            <a:pPr lvl="2"/>
+            <a:r>
+              <a:rPr lang="en-US" dirty="0" err="1"/>
+              <a:t>Matmul</a:t>
+            </a:r>
+            <a:r>
+              <a:rPr lang="en-US" dirty="0"/>
+              <a:t> ( [1, </a:t>
+            </a:r>
+            <a:r>
+              <a:rPr lang="en-US" dirty="0" err="1"/>
+              <a:t>hidden_dim</a:t>
+            </a:r>
+            <a:r>
+              <a:rPr lang="en-US" dirty="0"/>
+              <a:t>], [</a:t>
+            </a:r>
+            <a:r>
+              <a:rPr lang="en-US" dirty="0" err="1"/>
+              <a:t>hidden_dim</a:t>
+            </a:r>
+            <a:r>
+              <a:rPr lang="en-US" dirty="0"/>
+              <a:t>, </a:t>
+            </a:r>
+            <a:r>
+              <a:rPr lang="en-US" dirty="0" err="1"/>
+              <a:t>hidden_dim</a:t>
+            </a:r>
+            <a:r>
+              <a:rPr lang="en-US" dirty="0"/>
+              <a:t>] = [1, </a:t>
+            </a:r>
+            <a:r>
+              <a:rPr lang="en-US" dirty="0" err="1"/>
+              <a:t>hidden_dim</a:t>
+            </a:r>
+            <a:r>
+              <a:rPr lang="en-US" dirty="0"/>
+              <a:t>]</a:t>
+            </a:r>
+          </a:p>
+          <a:p>
+            <a:pPr lvl="2"/>
+            <a:endParaRPr lang="en-US" dirty="0"/>
+          </a:p>
+          <a:p>
+            <a:pPr lvl="1"/>
+            <a:r>
+              <a:rPr lang="en-US" dirty="0"/>
+              <a:t>Output of RNN cell:</a:t>
+            </a:r>
+          </a:p>
+          <a:p>
+            <a:pPr lvl="2"/>
+            <a:r>
+              <a:rPr lang="en-US" dirty="0"/>
+              <a:t>Concatenate </a:t>
+            </a:r>
+            <a:r>
+              <a:rPr lang="en-US" dirty="0" err="1"/>
+              <a:t>hidden_layer</a:t>
+            </a:r>
+            <a:r>
+              <a:rPr lang="en-US" dirty="0"/>
+              <a:t> and </a:t>
+            </a:r>
+            <a:r>
+              <a:rPr lang="en-US" dirty="0" err="1"/>
+              <a:t>input_layer</a:t>
+            </a:r>
+            <a:r>
+              <a:rPr lang="en-US" dirty="0"/>
+              <a:t>:</a:t>
+            </a:r>
+          </a:p>
+          <a:p>
+            <a:pPr lvl="3"/>
+            <a:r>
+              <a:rPr lang="en-US" dirty="0"/>
+              <a:t>[1, </a:t>
+            </a:r>
+            <a:r>
+              <a:rPr lang="en-US" dirty="0" err="1"/>
+              <a:t>hidden_dim</a:t>
+            </a:r>
+            <a:r>
+              <a:rPr lang="en-US" dirty="0"/>
+              <a:t>]. What do we about it?? </a:t>
+            </a:r>
+          </a:p>
+        </p:txBody>
+      </p:sp>
+    </p:spTree>
+    <p:extLst>
+      <p:ext uri="{BB962C8B-B14F-4D97-AF65-F5344CB8AC3E}">
+        <p14:creationId xmlns:p14="http://schemas.microsoft.com/office/powerpoint/2010/main" val="1950389262"/>
       </p:ext>
     </p:extLst>
   </p:cSld>

</xml_diff>